<commit_message>
modified recipe models namespace
</commit_message>
<xml_diff>
--- a/slides.pptx
+++ b/slides.pptx
@@ -5,38 +5,39 @@
     <p:sldMasterId id="2147483686" r:id="rId1"/>
   </p:sldMasterIdLst>
   <p:notesMasterIdLst>
-    <p:notesMasterId r:id="rId31"/>
+    <p:notesMasterId r:id="rId32"/>
   </p:notesMasterIdLst>
   <p:sldIdLst>
     <p:sldId id="256" r:id="rId2"/>
     <p:sldId id="257" r:id="rId3"/>
     <p:sldId id="309" r:id="rId4"/>
     <p:sldId id="310" r:id="rId5"/>
-    <p:sldId id="319" r:id="rId6"/>
-    <p:sldId id="321" r:id="rId7"/>
-    <p:sldId id="311" r:id="rId8"/>
-    <p:sldId id="317" r:id="rId9"/>
-    <p:sldId id="318" r:id="rId10"/>
-    <p:sldId id="323" r:id="rId11"/>
+    <p:sldId id="317" r:id="rId6"/>
+    <p:sldId id="318" r:id="rId7"/>
+    <p:sldId id="323" r:id="rId8"/>
+    <p:sldId id="321" r:id="rId9"/>
+    <p:sldId id="311" r:id="rId10"/>
+    <p:sldId id="319" r:id="rId11"/>
     <p:sldId id="336" r:id="rId12"/>
     <p:sldId id="312" r:id="rId13"/>
     <p:sldId id="297" r:id="rId14"/>
-    <p:sldId id="339" r:id="rId15"/>
-    <p:sldId id="330" r:id="rId16"/>
-    <p:sldId id="327" r:id="rId17"/>
-    <p:sldId id="313" r:id="rId18"/>
-    <p:sldId id="337" r:id="rId19"/>
-    <p:sldId id="331" r:id="rId20"/>
-    <p:sldId id="332" r:id="rId21"/>
-    <p:sldId id="333" r:id="rId22"/>
-    <p:sldId id="338" r:id="rId23"/>
-    <p:sldId id="314" r:id="rId24"/>
-    <p:sldId id="342" r:id="rId25"/>
-    <p:sldId id="340" r:id="rId26"/>
-    <p:sldId id="315" r:id="rId27"/>
-    <p:sldId id="341" r:id="rId28"/>
-    <p:sldId id="316" r:id="rId29"/>
-    <p:sldId id="307" r:id="rId30"/>
+    <p:sldId id="344" r:id="rId15"/>
+    <p:sldId id="339" r:id="rId16"/>
+    <p:sldId id="330" r:id="rId17"/>
+    <p:sldId id="327" r:id="rId18"/>
+    <p:sldId id="313" r:id="rId19"/>
+    <p:sldId id="337" r:id="rId20"/>
+    <p:sldId id="331" r:id="rId21"/>
+    <p:sldId id="332" r:id="rId22"/>
+    <p:sldId id="333" r:id="rId23"/>
+    <p:sldId id="338" r:id="rId24"/>
+    <p:sldId id="314" r:id="rId25"/>
+    <p:sldId id="342" r:id="rId26"/>
+    <p:sldId id="340" r:id="rId27"/>
+    <p:sldId id="315" r:id="rId28"/>
+    <p:sldId id="341" r:id="rId29"/>
+    <p:sldId id="316" r:id="rId30"/>
+    <p:sldId id="307" r:id="rId31"/>
   </p:sldIdLst>
   <p:sldSz cx="9144000" cy="6858000" type="screen4x3"/>
   <p:notesSz cx="6858000" cy="9144000"/>
@@ -563,18 +564,6 @@
           <a:bodyPr/>
           <a:lstStyle/>
           <a:p>
-            <a:r>
-              <a:rPr lang="en-US" dirty="0" err="1"/>
-              <a:t>Preklep</a:t>
-            </a:r>
-            <a:r>
-              <a:rPr lang="en-US" dirty="0"/>
-              <a:t> </a:t>
-            </a:r>
-            <a:r>
-              <a:rPr lang="en-US" dirty="0" err="1"/>
-              <a:t>sdilele</a:t>
-            </a:r>
             <a:endParaRPr lang="en-US" dirty="0"/>
           </a:p>
         </p:txBody>
@@ -680,7 +669,7 @@
           <a:p>
             <a:fld id="{F4323E56-F69C-4878-AA27-04FBC5F7F860}" type="slidenum">
               <a:rPr lang="cs-CZ" smtClean="0"/>
-              <a:t>8</a:t>
+              <a:t>5</a:t>
             </a:fld>
             <a:endParaRPr lang="cs-CZ"/>
           </a:p>
@@ -4598,7 +4587,7 @@
           <p:cNvPr id="2" name="Title 1">
             <a:extLst>
               <a:ext uri="{FF2B5EF4-FFF2-40B4-BE49-F238E27FC236}">
-                <a16:creationId xmlns:a16="http://schemas.microsoft.com/office/drawing/2014/main" id="{C6A426FE-FA3B-4652-95C0-D6FF6A8C72A3}"/>
+                <a16:creationId xmlns:a16="http://schemas.microsoft.com/office/drawing/2014/main" id="{863A9E48-D92A-4567-82F4-BD0A1283CC7C}"/>
               </a:ext>
             </a:extLst>
           </p:cNvPr>
@@ -4609,30 +4598,233 @@
             <p:ph type="title"/>
           </p:nvPr>
         </p:nvSpPr>
+        <p:spPr/>
+        <p:txBody>
+          <a:bodyPr>
+            <a:normAutofit/>
+          </a:bodyPr>
+          <a:lstStyle/>
+          <a:p>
+            <a:r>
+              <a:rPr lang="en-US" dirty="0" err="1"/>
+              <a:t>Fas</a:t>
+            </a:r>
+            <a:r>
+              <a:rPr lang="cs-CZ" dirty="0"/>
+              <a:t>ády </a:t>
+            </a:r>
+            <a:r>
+              <a:rPr lang="en-US" dirty="0"/>
+              <a:t>/ F</a:t>
+            </a:r>
+            <a:r>
+              <a:rPr lang="en-US" b="0" i="0" dirty="0">
+                <a:solidFill>
+                  <a:srgbClr val="222222"/>
+                </a:solidFill>
+                <a:effectLst/>
+                <a:latin typeface="Google Sans"/>
+              </a:rPr>
+              <a:t>açade</a:t>
+            </a:r>
+            <a:endParaRPr lang="en-US" dirty="0"/>
+          </a:p>
+        </p:txBody>
+      </p:sp>
+      <p:pic>
+        <p:nvPicPr>
+          <p:cNvPr id="5" name="Content Placeholder 4" descr="Diagram&#10;&#10;Description automatically generated">
+            <a:extLst>
+              <a:ext uri="{FF2B5EF4-FFF2-40B4-BE49-F238E27FC236}">
+                <a16:creationId xmlns:a16="http://schemas.microsoft.com/office/drawing/2014/main" id="{4C4B1453-250A-44FA-82F4-6148C9BF3EB6}"/>
+              </a:ext>
+            </a:extLst>
+          </p:cNvPr>
+          <p:cNvPicPr>
+            <a:picLocks noGrp="1" noChangeAspect="1"/>
+          </p:cNvPicPr>
+          <p:nvPr>
+            <p:ph idx="1"/>
+          </p:nvPr>
+        </p:nvPicPr>
+        <p:blipFill>
+          <a:blip r:embed="rId2">
+            <a:extLst>
+              <a:ext uri="{28A0092B-C50C-407E-A947-70E740481C1C}">
+                <a14:useLocalDpi xmlns:a14="http://schemas.microsoft.com/office/drawing/2010/main" val="0"/>
+              </a:ext>
+            </a:extLst>
+          </a:blip>
+          <a:stretch>
+            <a:fillRect/>
+          </a:stretch>
+        </p:blipFill>
         <p:spPr>
           <a:xfrm>
-            <a:off x="3491880" y="2857500"/>
-            <a:ext cx="2160240" cy="1143000"/>
+            <a:off x="3279274" y="2492896"/>
+            <a:ext cx="2585451" cy="3786566"/>
           </a:xfrm>
         </p:spPr>
-        <p:txBody>
-          <a:bodyPr>
-            <a:normAutofit fontScale="90000"/>
+      </p:pic>
+      <p:sp>
+        <p:nvSpPr>
+          <p:cNvPr id="6" name="TextBox 5">
+            <a:extLst>
+              <a:ext uri="{FF2B5EF4-FFF2-40B4-BE49-F238E27FC236}">
+                <a16:creationId xmlns:a16="http://schemas.microsoft.com/office/drawing/2014/main" id="{E3E82A94-6777-4A9A-B1C0-4A368D3CF3B7}"/>
+              </a:ext>
+            </a:extLst>
+          </p:cNvPr>
+          <p:cNvSpPr txBox="1"/>
+          <p:nvPr/>
+        </p:nvSpPr>
+        <p:spPr>
+          <a:xfrm>
+            <a:off x="440145" y="1898248"/>
+            <a:ext cx="8229600" cy="738664"/>
+          </a:xfrm>
+          <a:prstGeom prst="rect">
+            <a:avLst/>
+          </a:prstGeom>
+          <a:noFill/>
+        </p:spPr>
+        <p:txBody>
+          <a:bodyPr wrap="square" rtlCol="0">
+            <a:spAutoFit/>
           </a:bodyPr>
           <a:lstStyle/>
           <a:p>
-            <a:r>
-              <a:rPr lang="cs-CZ" dirty="0"/>
-              <a:t>NSWAG studio step by step</a:t>
-            </a:r>
-            <a:endParaRPr lang="en-US" dirty="0"/>
+            <a:pPr algn="just"/>
+            <a:r>
+              <a:rPr lang="cs-CZ" sz="1400" dirty="0"/>
+              <a:t>Softwarový návrhový vzor, který slouží ke zjednodušení komunikace mezi jednotlivými částmi systému. Fasáda je způsob nahrazení velkého počtu rozhraní subsystémů, sjednoceným rozhraním, které bude zaštitovat všechna rozhraní subsystémů.</a:t>
+            </a:r>
+            <a:endParaRPr lang="en-US" sz="1400" dirty="0"/>
+          </a:p>
+        </p:txBody>
+      </p:sp>
+      <p:sp>
+        <p:nvSpPr>
+          <p:cNvPr id="8" name="TextBox 7">
+            <a:extLst>
+              <a:ext uri="{FF2B5EF4-FFF2-40B4-BE49-F238E27FC236}">
+                <a16:creationId xmlns:a16="http://schemas.microsoft.com/office/drawing/2014/main" id="{176A10EE-B14E-4B65-AE9B-6BD72095A34B}"/>
+              </a:ext>
+            </a:extLst>
+          </p:cNvPr>
+          <p:cNvSpPr txBox="1"/>
+          <p:nvPr/>
+        </p:nvSpPr>
+        <p:spPr>
+          <a:xfrm>
+            <a:off x="440145" y="1124744"/>
+            <a:ext cx="8229600" cy="584775"/>
+          </a:xfrm>
+          <a:prstGeom prst="rect">
+            <a:avLst/>
+          </a:prstGeom>
+          <a:noFill/>
+        </p:spPr>
+        <p:txBody>
+          <a:bodyPr wrap="square" rtlCol="0">
+            <a:spAutoFit/>
+          </a:bodyPr>
+          <a:lstStyle/>
+          <a:p>
+            <a:pPr algn="ctr"/>
+            <a:r>
+              <a:rPr lang="cs-CZ" b="1" dirty="0">
+                <a:solidFill>
+                  <a:srgbClr val="C00000"/>
+                </a:solidFill>
+              </a:rPr>
+              <a:t>Způsob jak schovat komplexní magii za jednoduché rozhraní.</a:t>
+            </a:r>
+            <a:br>
+              <a:rPr lang="cs-CZ" b="1" dirty="0"/>
+            </a:br>
+            <a:r>
+              <a:rPr lang="cs-CZ" sz="1400" b="1" dirty="0"/>
+              <a:t>Umožnuje nám měnit vnitřní implementaci bez toho aby jsme rozbily kód co funkcionalitu používá.</a:t>
+            </a:r>
+            <a:endParaRPr lang="en-US" b="1" dirty="0"/>
+          </a:p>
+        </p:txBody>
+      </p:sp>
+      <p:sp>
+        <p:nvSpPr>
+          <p:cNvPr id="9" name="TextBox 8">
+            <a:extLst>
+              <a:ext uri="{FF2B5EF4-FFF2-40B4-BE49-F238E27FC236}">
+                <a16:creationId xmlns:a16="http://schemas.microsoft.com/office/drawing/2014/main" id="{18908FD3-59C8-4B22-915A-1FC03D0B9C8A}"/>
+              </a:ext>
+            </a:extLst>
+          </p:cNvPr>
+          <p:cNvSpPr txBox="1"/>
+          <p:nvPr/>
+        </p:nvSpPr>
+        <p:spPr>
+          <a:xfrm>
+            <a:off x="167580" y="1628800"/>
+            <a:ext cx="476911" cy="1200329"/>
+          </a:xfrm>
+          <a:prstGeom prst="rect">
+            <a:avLst/>
+          </a:prstGeom>
+          <a:noFill/>
+        </p:spPr>
+        <p:txBody>
+          <a:bodyPr wrap="square" rtlCol="0">
+            <a:spAutoFit/>
+          </a:bodyPr>
+          <a:lstStyle/>
+          <a:p>
+            <a:r>
+              <a:rPr lang="en-US" sz="7200" dirty="0"/>
+              <a:t>{</a:t>
+            </a:r>
+          </a:p>
+        </p:txBody>
+      </p:sp>
+      <p:sp>
+        <p:nvSpPr>
+          <p:cNvPr id="11" name="TextBox 10">
+            <a:extLst>
+              <a:ext uri="{FF2B5EF4-FFF2-40B4-BE49-F238E27FC236}">
+                <a16:creationId xmlns:a16="http://schemas.microsoft.com/office/drawing/2014/main" id="{AFDEBB38-0FC9-4F65-A675-8417312B2E31}"/>
+              </a:ext>
+            </a:extLst>
+          </p:cNvPr>
+          <p:cNvSpPr txBox="1"/>
+          <p:nvPr/>
+        </p:nvSpPr>
+        <p:spPr>
+          <a:xfrm>
+            <a:off x="8431289" y="1628799"/>
+            <a:ext cx="476911" cy="1200329"/>
+          </a:xfrm>
+          <a:prstGeom prst="rect">
+            <a:avLst/>
+          </a:prstGeom>
+          <a:noFill/>
+        </p:spPr>
+        <p:txBody>
+          <a:bodyPr wrap="square" rtlCol="0">
+            <a:spAutoFit/>
+          </a:bodyPr>
+          <a:lstStyle/>
+          <a:p>
+            <a:r>
+              <a:rPr lang="en-US" sz="7200" dirty="0"/>
+              <a:t>}</a:t>
+            </a:r>
           </a:p>
         </p:txBody>
       </p:sp>
     </p:spTree>
     <p:extLst>
       <p:ext uri="{BB962C8B-B14F-4D97-AF65-F5344CB8AC3E}">
-        <p14:creationId xmlns:p14="http://schemas.microsoft.com/office/powerpoint/2010/main" val="2202362840"/>
+        <p14:creationId xmlns:p14="http://schemas.microsoft.com/office/powerpoint/2010/main" val="2079306316"/>
       </p:ext>
     </p:extLst>
   </p:cSld>
@@ -4794,6 +4986,7 @@
               <a:rPr lang="cs-CZ" strike="sngStrike" dirty="0"/>
               <a:t>Vytvořit CookBook.BL.WEB.</a:t>
             </a:r>
+            <a:endParaRPr lang="en-US" strike="sngStrike" dirty="0"/>
           </a:p>
           <a:p>
             <a:pPr marL="914400" lvl="1" indent="-457200">
@@ -4802,7 +4995,7 @@
             </a:pPr>
             <a:r>
               <a:rPr lang="cs-CZ" strike="sngStrike" dirty="0"/>
-              <a:t>Vytvořit fasády.</a:t>
+              <a:t>Vygenerovat API klienty.</a:t>
             </a:r>
           </a:p>
           <a:p>
@@ -4812,7 +5005,7 @@
             </a:pPr>
             <a:r>
               <a:rPr lang="cs-CZ" strike="sngStrike" dirty="0"/>
-              <a:t>Vygenerovat API klienty.</a:t>
+              <a:t>Vytvořit fasády.</a:t>
             </a:r>
           </a:p>
           <a:p>
@@ -4974,50 +5167,721 @@
         </p:nvSpPr>
         <p:spPr/>
         <p:txBody>
-          <a:bodyPr/>
+          <a:bodyPr>
+            <a:normAutofit/>
+          </a:bodyPr>
           <a:lstStyle/>
           <a:p>
-            <a:r>
-              <a:rPr lang="en-US" dirty="0"/>
-              <a:t>Set in Solution Properties</a:t>
-            </a:r>
-          </a:p>
-          <a:p>
-            <a:r>
-              <a:rPr lang="en-US" dirty="0"/>
-              <a:t>Use </a:t>
-            </a:r>
-            <a:r>
-              <a:rPr lang="en-US" dirty="0" err="1">
-                <a:hlinkClick r:id="rId2"/>
-              </a:rPr>
-              <a:t>SwitchStartupProject</a:t>
-            </a:r>
-            <a:r>
-              <a:rPr lang="en-US" dirty="0"/>
-              <a:t> extension</a:t>
-            </a:r>
-          </a:p>
-          <a:p>
-            <a:pPr lvl="1"/>
-            <a:r>
-              <a:rPr lang="en-US" dirty="0"/>
-              <a:t>Can setup multiple configurations</a:t>
-            </a:r>
-          </a:p>
-          <a:p>
-            <a:pPr lvl="1"/>
-            <a:r>
-              <a:rPr lang="en-US" dirty="0"/>
-              <a:t>Easy to switch between configurations</a:t>
-            </a:r>
-          </a:p>
-        </p:txBody>
-      </p:sp>
+            <a:pPr marL="0" indent="0">
+              <a:buNone/>
+            </a:pPr>
+            <a:r>
+              <a:rPr lang="en-US" sz="2000" dirty="0"/>
+              <a:t>Pomo</a:t>
+            </a:r>
+            <a:r>
+              <a:rPr lang="cs-CZ" sz="2000" dirty="0"/>
+              <a:t>cí Solution properties </a:t>
+            </a:r>
+            <a:r>
+              <a:rPr lang="en-US" sz="2000" dirty="0"/>
+              <a:t>=&gt; Startup Project =&gt; Multiple Startup Project.</a:t>
+            </a:r>
+          </a:p>
+        </p:txBody>
+      </p:sp>
+      <p:pic>
+        <p:nvPicPr>
+          <p:cNvPr id="4" name="Picture 3">
+            <a:extLst>
+              <a:ext uri="{FF2B5EF4-FFF2-40B4-BE49-F238E27FC236}">
+                <a16:creationId xmlns:a16="http://schemas.microsoft.com/office/drawing/2014/main" id="{48ECAE6B-B8F4-43D0-942A-5DC4FCABDF94}"/>
+              </a:ext>
+            </a:extLst>
+          </p:cNvPr>
+          <p:cNvPicPr>
+            <a:picLocks noChangeAspect="1"/>
+          </p:cNvPicPr>
+          <p:nvPr/>
+        </p:nvPicPr>
+        <p:blipFill>
+          <a:blip r:embed="rId2"/>
+          <a:stretch>
+            <a:fillRect/>
+          </a:stretch>
+        </p:blipFill>
+        <p:spPr>
+          <a:xfrm>
+            <a:off x="1167733" y="2060848"/>
+            <a:ext cx="6808534" cy="3832477"/>
+          </a:xfrm>
+          <a:prstGeom prst="rect">
+            <a:avLst/>
+          </a:prstGeom>
+        </p:spPr>
+      </p:pic>
     </p:spTree>
     <p:extLst>
       <p:ext uri="{BB962C8B-B14F-4D97-AF65-F5344CB8AC3E}">
         <p14:creationId xmlns:p14="http://schemas.microsoft.com/office/powerpoint/2010/main" val="767007583"/>
+      </p:ext>
+    </p:extLst>
+  </p:cSld>
+  <p:clrMapOvr>
+    <a:masterClrMapping/>
+  </p:clrMapOvr>
+  <p:transition spd="slow">
+    <p:push dir="u"/>
+  </p:transition>
+  <p:timing>
+    <p:tnLst>
+      <p:par>
+        <p:cTn id="1" dur="indefinite" restart="never" nodeType="tmRoot">
+          <p:childTnLst>
+            <p:seq concurrent="1" nextAc="seek">
+              <p:cTn id="2" dur="indefinite" nodeType="mainSeq">
+                <p:childTnLst>
+                  <p:par>
+                    <p:cTn id="3" fill="hold">
+                      <p:stCondLst>
+                        <p:cond delay="indefinite"/>
+                      </p:stCondLst>
+                      <p:childTnLst>
+                        <p:par>
+                          <p:cTn id="4" fill="hold">
+                            <p:stCondLst>
+                              <p:cond delay="0"/>
+                            </p:stCondLst>
+                            <p:childTnLst>
+                              <p:par>
+                                <p:cTn id="5" presetID="1" presetClass="entr" presetSubtype="0" fill="hold" grpId="0" nodeType="clickEffect">
+                                  <p:stCondLst>
+                                    <p:cond delay="0"/>
+                                  </p:stCondLst>
+                                  <p:childTnLst>
+                                    <p:set>
+                                      <p:cBhvr>
+                                        <p:cTn id="6" dur="1" fill="hold">
+                                          <p:stCondLst>
+                                            <p:cond delay="0"/>
+                                          </p:stCondLst>
+                                        </p:cTn>
+                                        <p:tgtEl>
+                                          <p:spTgt spid="3">
+                                            <p:txEl>
+                                              <p:pRg st="0" end="0"/>
+                                            </p:txEl>
+                                          </p:spTgt>
+                                        </p:tgtEl>
+                                        <p:attrNameLst>
+                                          <p:attrName>style.visibility</p:attrName>
+                                        </p:attrNameLst>
+                                      </p:cBhvr>
+                                      <p:to>
+                                        <p:strVal val="visible"/>
+                                      </p:to>
+                                    </p:set>
+                                  </p:childTnLst>
+                                </p:cTn>
+                              </p:par>
+                            </p:childTnLst>
+                          </p:cTn>
+                        </p:par>
+                      </p:childTnLst>
+                    </p:cTn>
+                  </p:par>
+                </p:childTnLst>
+              </p:cTn>
+              <p:prevCondLst>
+                <p:cond evt="onPrev" delay="0">
+                  <p:tgtEl>
+                    <p:sldTgt/>
+                  </p:tgtEl>
+                </p:cond>
+              </p:prevCondLst>
+              <p:nextCondLst>
+                <p:cond evt="onNext" delay="0">
+                  <p:tgtEl>
+                    <p:sldTgt/>
+                  </p:tgtEl>
+                </p:cond>
+              </p:nextCondLst>
+            </p:seq>
+          </p:childTnLst>
+        </p:cTn>
+      </p:par>
+    </p:tnLst>
+    <p:bldLst>
+      <p:bldP spid="3" grpId="0" uiExpand="1" build="p"/>
+    </p:bldLst>
+  </p:timing>
+</p:sld>
+</file>
+
+<file path=ppt/slides/slide14.xml><?xml version="1.0" encoding="utf-8"?>
+<p:sld xmlns:a="http://schemas.openxmlformats.org/drawingml/2006/main" xmlns:r="http://schemas.openxmlformats.org/officeDocument/2006/relationships" xmlns:p="http://schemas.openxmlformats.org/presentationml/2006/main">
+  <p:cSld>
+    <p:spTree>
+      <p:nvGrpSpPr>
+        <p:cNvPr id="1" name=""/>
+        <p:cNvGrpSpPr/>
+        <p:nvPr/>
+      </p:nvGrpSpPr>
+      <p:grpSpPr>
+        <a:xfrm>
+          <a:off x="0" y="0"/>
+          <a:ext cx="0" cy="0"/>
+          <a:chOff x="0" y="0"/>
+          <a:chExt cx="0" cy="0"/>
+        </a:xfrm>
+      </p:grpSpPr>
+      <p:sp>
+        <p:nvSpPr>
+          <p:cNvPr id="2" name="Title 1">
+            <a:extLst>
+              <a:ext uri="{FF2B5EF4-FFF2-40B4-BE49-F238E27FC236}">
+                <a16:creationId xmlns:a16="http://schemas.microsoft.com/office/drawing/2014/main" id="{583DF635-7948-4F9C-9F60-21CFAD85AAAF}"/>
+              </a:ext>
+            </a:extLst>
+          </p:cNvPr>
+          <p:cNvSpPr>
+            <a:spLocks noGrp="1"/>
+          </p:cNvSpPr>
+          <p:nvPr>
+            <p:ph type="title"/>
+          </p:nvPr>
+        </p:nvSpPr>
+        <p:spPr/>
+        <p:txBody>
+          <a:bodyPr/>
+          <a:lstStyle/>
+          <a:p>
+            <a:r>
+              <a:rPr lang="sk-SK" dirty="0" err="1"/>
+              <a:t>Multiple</a:t>
+            </a:r>
+            <a:r>
+              <a:rPr lang="sk-SK" dirty="0"/>
+              <a:t> Startup </a:t>
+            </a:r>
+            <a:r>
+              <a:rPr lang="sk-SK" dirty="0" err="1"/>
+              <a:t>Projects</a:t>
+            </a:r>
+            <a:endParaRPr lang="sk-SK" dirty="0"/>
+          </a:p>
+        </p:txBody>
+      </p:sp>
+      <p:sp>
+        <p:nvSpPr>
+          <p:cNvPr id="3" name="Content Placeholder 2">
+            <a:extLst>
+              <a:ext uri="{FF2B5EF4-FFF2-40B4-BE49-F238E27FC236}">
+                <a16:creationId xmlns:a16="http://schemas.microsoft.com/office/drawing/2014/main" id="{991F9301-949F-4868-896D-568877DFFAE6}"/>
+              </a:ext>
+            </a:extLst>
+          </p:cNvPr>
+          <p:cNvSpPr>
+            <a:spLocks noGrp="1"/>
+          </p:cNvSpPr>
+          <p:nvPr>
+            <p:ph idx="1"/>
+          </p:nvPr>
+        </p:nvSpPr>
+        <p:spPr>
+          <a:xfrm>
+            <a:off x="457200" y="1600201"/>
+            <a:ext cx="8229600" cy="1396751"/>
+          </a:xfrm>
+        </p:spPr>
+        <p:txBody>
+          <a:bodyPr>
+            <a:normAutofit/>
+          </a:bodyPr>
+          <a:lstStyle/>
+          <a:p>
+            <a:pPr marL="0" indent="0">
+              <a:buNone/>
+            </a:pPr>
+            <a:r>
+              <a:rPr lang="en-US" sz="2000" dirty="0"/>
+              <a:t>Extension </a:t>
+            </a:r>
+            <a:r>
+              <a:rPr lang="en-US" sz="2000" dirty="0" err="1">
+                <a:hlinkClick r:id="rId2"/>
+              </a:rPr>
+              <a:t>SwitchStartupProject</a:t>
+            </a:r>
+            <a:endParaRPr lang="en-US" sz="2000" dirty="0"/>
+          </a:p>
+          <a:p>
+            <a:pPr marL="0" indent="0">
+              <a:buNone/>
+            </a:pPr>
+            <a:r>
+              <a:rPr lang="en-US" sz="2000" dirty="0"/>
+              <a:t>V</a:t>
+            </a:r>
+            <a:r>
+              <a:rPr lang="cs-CZ" sz="2000" dirty="0"/>
+              <a:t>íce pojmenovaných konfigurací pomocí JSON souboru.</a:t>
+            </a:r>
+          </a:p>
+          <a:p>
+            <a:pPr marL="0" indent="0">
+              <a:buNone/>
+            </a:pPr>
+            <a:r>
+              <a:rPr lang="cs-CZ" sz="2000" dirty="0"/>
+              <a:t>Dovoluje nastavit více spouštěných projektů a specifikaci parametrů.</a:t>
+            </a:r>
+          </a:p>
+          <a:p>
+            <a:pPr marL="0" indent="0">
+              <a:buNone/>
+            </a:pPr>
+            <a:endParaRPr lang="cs-CZ" sz="2000" dirty="0"/>
+          </a:p>
+          <a:p>
+            <a:pPr marL="0" indent="0">
+              <a:buNone/>
+            </a:pPr>
+            <a:endParaRPr lang="en-US" sz="2000" dirty="0"/>
+          </a:p>
+        </p:txBody>
+      </p:sp>
+      <p:sp>
+        <p:nvSpPr>
+          <p:cNvPr id="8" name="TextBox 7">
+            <a:extLst>
+              <a:ext uri="{FF2B5EF4-FFF2-40B4-BE49-F238E27FC236}">
+                <a16:creationId xmlns:a16="http://schemas.microsoft.com/office/drawing/2014/main" id="{3B0921B9-D3ED-4944-AEEC-C02363D9BCB4}"/>
+              </a:ext>
+            </a:extLst>
+          </p:cNvPr>
+          <p:cNvSpPr txBox="1"/>
+          <p:nvPr/>
+        </p:nvSpPr>
+        <p:spPr>
+          <a:xfrm>
+            <a:off x="453526" y="2793080"/>
+            <a:ext cx="8366946" cy="3539430"/>
+          </a:xfrm>
+          <a:prstGeom prst="rect">
+            <a:avLst/>
+          </a:prstGeom>
+          <a:noFill/>
+        </p:spPr>
+        <p:txBody>
+          <a:bodyPr wrap="square">
+            <a:spAutoFit/>
+          </a:bodyPr>
+          <a:lstStyle/>
+          <a:p>
+            <a:r>
+              <a:rPr lang="en-US" sz="1400" dirty="0">
+                <a:solidFill>
+                  <a:srgbClr val="000000"/>
+                </a:solidFill>
+                <a:latin typeface="Consolas" panose="020B0609020204030204" pitchFamily="49" charset="0"/>
+              </a:rPr>
+              <a:t>{</a:t>
+            </a:r>
+          </a:p>
+          <a:p>
+            <a:r>
+              <a:rPr lang="en-US" sz="1400" dirty="0">
+                <a:solidFill>
+                  <a:srgbClr val="000000"/>
+                </a:solidFill>
+                <a:latin typeface="Consolas" panose="020B0609020204030204" pitchFamily="49" charset="0"/>
+              </a:rPr>
+              <a:t>  </a:t>
+            </a:r>
+            <a:r>
+              <a:rPr lang="en-US" sz="1400" dirty="0">
+                <a:solidFill>
+                  <a:srgbClr val="2E75B6"/>
+                </a:solidFill>
+                <a:latin typeface="Consolas" panose="020B0609020204030204" pitchFamily="49" charset="0"/>
+              </a:rPr>
+              <a:t>"Version"</a:t>
+            </a:r>
+            <a:r>
+              <a:rPr lang="en-US" sz="1400" dirty="0">
+                <a:solidFill>
+                  <a:srgbClr val="000000"/>
+                </a:solidFill>
+                <a:latin typeface="Consolas" panose="020B0609020204030204" pitchFamily="49" charset="0"/>
+              </a:rPr>
+              <a:t>: 3,</a:t>
+            </a:r>
+          </a:p>
+          <a:p>
+            <a:endParaRPr lang="en-US" sz="1400" dirty="0">
+              <a:solidFill>
+                <a:srgbClr val="000000"/>
+              </a:solidFill>
+              <a:latin typeface="Consolas" panose="020B0609020204030204" pitchFamily="49" charset="0"/>
+            </a:endParaRPr>
+          </a:p>
+          <a:p>
+            <a:r>
+              <a:rPr lang="en-US" sz="1400" dirty="0">
+                <a:solidFill>
+                  <a:srgbClr val="000000"/>
+                </a:solidFill>
+                <a:latin typeface="Consolas" panose="020B0609020204030204" pitchFamily="49" charset="0"/>
+              </a:rPr>
+              <a:t>  </a:t>
+            </a:r>
+            <a:r>
+              <a:rPr lang="en-US" sz="1400" dirty="0">
+                <a:solidFill>
+                  <a:srgbClr val="008000"/>
+                </a:solidFill>
+                <a:latin typeface="Consolas" panose="020B0609020204030204" pitchFamily="49" charset="0"/>
+              </a:rPr>
+              <a:t>/*  Create an item in the dropdown list for each project in the solution?  */</a:t>
+            </a:r>
+            <a:endParaRPr lang="en-US" sz="1400" dirty="0">
+              <a:solidFill>
+                <a:srgbClr val="000000"/>
+              </a:solidFill>
+              <a:latin typeface="Consolas" panose="020B0609020204030204" pitchFamily="49" charset="0"/>
+            </a:endParaRPr>
+          </a:p>
+          <a:p>
+            <a:r>
+              <a:rPr lang="en-US" sz="1400" dirty="0">
+                <a:solidFill>
+                  <a:srgbClr val="000000"/>
+                </a:solidFill>
+                <a:latin typeface="Consolas" panose="020B0609020204030204" pitchFamily="49" charset="0"/>
+              </a:rPr>
+              <a:t>  </a:t>
+            </a:r>
+            <a:r>
+              <a:rPr lang="en-US" sz="1400" dirty="0">
+                <a:solidFill>
+                  <a:srgbClr val="2E75B6"/>
+                </a:solidFill>
+                <a:latin typeface="Consolas" panose="020B0609020204030204" pitchFamily="49" charset="0"/>
+              </a:rPr>
+              <a:t>"</a:t>
+            </a:r>
+            <a:r>
+              <a:rPr lang="en-US" sz="1400" dirty="0" err="1">
+                <a:solidFill>
+                  <a:srgbClr val="2E75B6"/>
+                </a:solidFill>
+                <a:latin typeface="Consolas" panose="020B0609020204030204" pitchFamily="49" charset="0"/>
+              </a:rPr>
+              <a:t>ListAllProjects</a:t>
+            </a:r>
+            <a:r>
+              <a:rPr lang="en-US" sz="1400" dirty="0">
+                <a:solidFill>
+                  <a:srgbClr val="2E75B6"/>
+                </a:solidFill>
+                <a:latin typeface="Consolas" panose="020B0609020204030204" pitchFamily="49" charset="0"/>
+              </a:rPr>
+              <a:t>"</a:t>
+            </a:r>
+            <a:r>
+              <a:rPr lang="en-US" sz="1400" dirty="0">
+                <a:solidFill>
+                  <a:srgbClr val="000000"/>
+                </a:solidFill>
+                <a:latin typeface="Consolas" panose="020B0609020204030204" pitchFamily="49" charset="0"/>
+              </a:rPr>
+              <a:t>: </a:t>
+            </a:r>
+            <a:r>
+              <a:rPr lang="en-US" sz="1400" dirty="0">
+                <a:solidFill>
+                  <a:srgbClr val="0000FF"/>
+                </a:solidFill>
+                <a:latin typeface="Consolas" panose="020B0609020204030204" pitchFamily="49" charset="0"/>
+              </a:rPr>
+              <a:t>true</a:t>
+            </a:r>
+            <a:r>
+              <a:rPr lang="en-US" sz="1400" dirty="0">
+                <a:solidFill>
+                  <a:srgbClr val="000000"/>
+                </a:solidFill>
+                <a:latin typeface="Consolas" panose="020B0609020204030204" pitchFamily="49" charset="0"/>
+              </a:rPr>
+              <a:t>,</a:t>
+            </a:r>
+          </a:p>
+          <a:p>
+            <a:endParaRPr lang="en-US" sz="1400" dirty="0">
+              <a:solidFill>
+                <a:srgbClr val="000000"/>
+              </a:solidFill>
+              <a:latin typeface="Consolas" panose="020B0609020204030204" pitchFamily="49" charset="0"/>
+            </a:endParaRPr>
+          </a:p>
+          <a:p>
+            <a:r>
+              <a:rPr lang="en-US" sz="1400" dirty="0">
+                <a:solidFill>
+                  <a:srgbClr val="000000"/>
+                </a:solidFill>
+                <a:latin typeface="Consolas" panose="020B0609020204030204" pitchFamily="49" charset="0"/>
+              </a:rPr>
+              <a:t>  </a:t>
+            </a:r>
+            <a:r>
+              <a:rPr lang="en-US" sz="1400" dirty="0">
+                <a:solidFill>
+                  <a:srgbClr val="2E75B6"/>
+                </a:solidFill>
+                <a:latin typeface="Consolas" panose="020B0609020204030204" pitchFamily="49" charset="0"/>
+              </a:rPr>
+              <a:t>"</a:t>
+            </a:r>
+            <a:r>
+              <a:rPr lang="en-US" sz="1400" dirty="0" err="1">
+                <a:solidFill>
+                  <a:srgbClr val="2E75B6"/>
+                </a:solidFill>
+                <a:latin typeface="Consolas" panose="020B0609020204030204" pitchFamily="49" charset="0"/>
+              </a:rPr>
+              <a:t>MultiProjectConfigurations</a:t>
+            </a:r>
+            <a:r>
+              <a:rPr lang="en-US" sz="1400" dirty="0">
+                <a:solidFill>
+                  <a:srgbClr val="2E75B6"/>
+                </a:solidFill>
+                <a:latin typeface="Consolas" panose="020B0609020204030204" pitchFamily="49" charset="0"/>
+              </a:rPr>
+              <a:t>"</a:t>
+            </a:r>
+            <a:r>
+              <a:rPr lang="en-US" sz="1400" dirty="0">
+                <a:solidFill>
+                  <a:srgbClr val="000000"/>
+                </a:solidFill>
+                <a:latin typeface="Consolas" panose="020B0609020204030204" pitchFamily="49" charset="0"/>
+              </a:rPr>
+              <a:t>: {</a:t>
+            </a:r>
+          </a:p>
+          <a:p>
+            <a:r>
+              <a:rPr lang="en-US" sz="1400" dirty="0">
+                <a:solidFill>
+                  <a:srgbClr val="000000"/>
+                </a:solidFill>
+                <a:latin typeface="Consolas" panose="020B0609020204030204" pitchFamily="49" charset="0"/>
+              </a:rPr>
+              <a:t>    </a:t>
+            </a:r>
+            <a:r>
+              <a:rPr lang="en-US" sz="1400" dirty="0">
+                <a:solidFill>
+                  <a:srgbClr val="2E75B6"/>
+                </a:solidFill>
+                <a:latin typeface="Consolas" panose="020B0609020204030204" pitchFamily="49" charset="0"/>
+              </a:rPr>
+              <a:t>"API + WEB"</a:t>
+            </a:r>
+            <a:r>
+              <a:rPr lang="en-US" sz="1400" dirty="0">
+                <a:solidFill>
+                  <a:srgbClr val="000000"/>
+                </a:solidFill>
+                <a:latin typeface="Consolas" panose="020B0609020204030204" pitchFamily="49" charset="0"/>
+              </a:rPr>
+              <a:t>: {</a:t>
+            </a:r>
+          </a:p>
+          <a:p>
+            <a:r>
+              <a:rPr lang="en-US" sz="1400" dirty="0">
+                <a:solidFill>
+                  <a:srgbClr val="000000"/>
+                </a:solidFill>
+                <a:latin typeface="Consolas" panose="020B0609020204030204" pitchFamily="49" charset="0"/>
+              </a:rPr>
+              <a:t>      </a:t>
+            </a:r>
+            <a:r>
+              <a:rPr lang="en-US" sz="1400" dirty="0">
+                <a:solidFill>
+                  <a:srgbClr val="2E75B6"/>
+                </a:solidFill>
+                <a:latin typeface="Consolas" panose="020B0609020204030204" pitchFamily="49" charset="0"/>
+              </a:rPr>
+              <a:t>"Projects"</a:t>
+            </a:r>
+            <a:r>
+              <a:rPr lang="en-US" sz="1400" dirty="0">
+                <a:solidFill>
+                  <a:srgbClr val="000000"/>
+                </a:solidFill>
+                <a:latin typeface="Consolas" panose="020B0609020204030204" pitchFamily="49" charset="0"/>
+              </a:rPr>
+              <a:t>: {</a:t>
+            </a:r>
+          </a:p>
+          <a:p>
+            <a:r>
+              <a:rPr lang="en-US" sz="1400" dirty="0">
+                <a:solidFill>
+                  <a:srgbClr val="000000"/>
+                </a:solidFill>
+                <a:latin typeface="Consolas" panose="020B0609020204030204" pitchFamily="49" charset="0"/>
+              </a:rPr>
+              <a:t>        </a:t>
+            </a:r>
+            <a:r>
+              <a:rPr lang="en-US" sz="1400" dirty="0">
+                <a:solidFill>
+                  <a:srgbClr val="2E75B6"/>
+                </a:solidFill>
+                <a:latin typeface="Consolas" panose="020B0609020204030204" pitchFamily="49" charset="0"/>
+              </a:rPr>
+              <a:t>"</a:t>
+            </a:r>
+            <a:r>
+              <a:rPr lang="en-US" sz="1400" dirty="0" err="1">
+                <a:solidFill>
+                  <a:srgbClr val="2E75B6"/>
+                </a:solidFill>
+                <a:latin typeface="Consolas" panose="020B0609020204030204" pitchFamily="49" charset="0"/>
+              </a:rPr>
+              <a:t>CookBook.Api</a:t>
+            </a:r>
+            <a:r>
+              <a:rPr lang="en-US" sz="1400" dirty="0">
+                <a:solidFill>
+                  <a:srgbClr val="2E75B6"/>
+                </a:solidFill>
+                <a:latin typeface="Consolas" panose="020B0609020204030204" pitchFamily="49" charset="0"/>
+              </a:rPr>
+              <a:t>"</a:t>
+            </a:r>
+            <a:r>
+              <a:rPr lang="en-US" sz="1400" dirty="0">
+                <a:solidFill>
+                  <a:srgbClr val="000000"/>
+                </a:solidFill>
+                <a:latin typeface="Consolas" panose="020B0609020204030204" pitchFamily="49" charset="0"/>
+              </a:rPr>
+              <a:t>: {},</a:t>
+            </a:r>
+          </a:p>
+          <a:p>
+            <a:r>
+              <a:rPr lang="en-US" sz="1400" dirty="0">
+                <a:solidFill>
+                  <a:srgbClr val="000000"/>
+                </a:solidFill>
+                <a:latin typeface="Consolas" panose="020B0609020204030204" pitchFamily="49" charset="0"/>
+              </a:rPr>
+              <a:t>        </a:t>
+            </a:r>
+            <a:r>
+              <a:rPr lang="en-US" sz="1400" dirty="0">
+                <a:solidFill>
+                  <a:srgbClr val="2E75B6"/>
+                </a:solidFill>
+                <a:latin typeface="Consolas" panose="020B0609020204030204" pitchFamily="49" charset="0"/>
+              </a:rPr>
+              <a:t>"</a:t>
+            </a:r>
+            <a:r>
+              <a:rPr lang="en-US" sz="1400" dirty="0" err="1">
+                <a:solidFill>
+                  <a:srgbClr val="2E75B6"/>
+                </a:solidFill>
+                <a:latin typeface="Consolas" panose="020B0609020204030204" pitchFamily="49" charset="0"/>
+              </a:rPr>
+              <a:t>CookBook.Web</a:t>
+            </a:r>
+            <a:r>
+              <a:rPr lang="en-US" sz="1400" dirty="0">
+                <a:solidFill>
+                  <a:srgbClr val="2E75B6"/>
+                </a:solidFill>
+                <a:latin typeface="Consolas" panose="020B0609020204030204" pitchFamily="49" charset="0"/>
+              </a:rPr>
+              <a:t>"</a:t>
+            </a:r>
+            <a:r>
+              <a:rPr lang="en-US" sz="1400" dirty="0">
+                <a:solidFill>
+                  <a:srgbClr val="000000"/>
+                </a:solidFill>
+                <a:latin typeface="Consolas" panose="020B0609020204030204" pitchFamily="49" charset="0"/>
+              </a:rPr>
+              <a:t>: {}</a:t>
+            </a:r>
+          </a:p>
+          <a:p>
+            <a:r>
+              <a:rPr lang="en-US" sz="1400" dirty="0">
+                <a:solidFill>
+                  <a:srgbClr val="000000"/>
+                </a:solidFill>
+                <a:latin typeface="Consolas" panose="020B0609020204030204" pitchFamily="49" charset="0"/>
+              </a:rPr>
+              <a:t>      }</a:t>
+            </a:r>
+          </a:p>
+          <a:p>
+            <a:endParaRPr lang="en-US" sz="1400" dirty="0">
+              <a:solidFill>
+                <a:srgbClr val="000000"/>
+              </a:solidFill>
+              <a:latin typeface="Consolas" panose="020B0609020204030204" pitchFamily="49" charset="0"/>
+            </a:endParaRPr>
+          </a:p>
+          <a:p>
+            <a:r>
+              <a:rPr lang="en-US" sz="1400" dirty="0">
+                <a:solidFill>
+                  <a:srgbClr val="000000"/>
+                </a:solidFill>
+                <a:latin typeface="Consolas" panose="020B0609020204030204" pitchFamily="49" charset="0"/>
+              </a:rPr>
+              <a:t>    }</a:t>
+            </a:r>
+          </a:p>
+          <a:p>
+            <a:r>
+              <a:rPr lang="en-US" sz="1400" dirty="0">
+                <a:solidFill>
+                  <a:srgbClr val="000000"/>
+                </a:solidFill>
+                <a:latin typeface="Consolas" panose="020B0609020204030204" pitchFamily="49" charset="0"/>
+              </a:rPr>
+              <a:t>  }</a:t>
+            </a:r>
+          </a:p>
+          <a:p>
+            <a:r>
+              <a:rPr lang="en-US" sz="1400" dirty="0">
+                <a:solidFill>
+                  <a:srgbClr val="000000"/>
+                </a:solidFill>
+                <a:latin typeface="Consolas" panose="020B0609020204030204" pitchFamily="49" charset="0"/>
+              </a:rPr>
+              <a:t>}</a:t>
+            </a:r>
+          </a:p>
+        </p:txBody>
+      </p:sp>
+    </p:spTree>
+    <p:extLst>
+      <p:ext uri="{BB962C8B-B14F-4D97-AF65-F5344CB8AC3E}">
+        <p14:creationId xmlns:p14="http://schemas.microsoft.com/office/powerpoint/2010/main" val="1665037851"/>
       </p:ext>
     </p:extLst>
   </p:cSld>
@@ -5127,39 +5991,26 @@
                                   </p:childTnLst>
                                 </p:cTn>
                               </p:par>
+                            </p:childTnLst>
+                          </p:cTn>
+                        </p:par>
+                      </p:childTnLst>
+                    </p:cTn>
+                  </p:par>
+                  <p:par>
+                    <p:cTn id="11" fill="hold">
+                      <p:stCondLst>
+                        <p:cond delay="indefinite"/>
+                      </p:stCondLst>
+                      <p:childTnLst>
+                        <p:par>
+                          <p:cTn id="12" fill="hold">
+                            <p:stCondLst>
+                              <p:cond delay="0"/>
+                            </p:stCondLst>
+                            <p:childTnLst>
                               <p:par>
-                                <p:cTn id="11" presetID="1" presetClass="entr" presetSubtype="0" fill="hold" grpId="0" nodeType="withEffect">
-                                  <p:stCondLst>
-                                    <p:cond delay="0"/>
-                                  </p:stCondLst>
-                                  <p:childTnLst>
-                                    <p:set>
-                                      <p:cBhvr>
-                                        <p:cTn id="12" dur="1" fill="hold">
-                                          <p:stCondLst>
-                                            <p:cond delay="0"/>
-                                          </p:stCondLst>
-                                        </p:cTn>
-                                        <p:tgtEl>
-                                          <p:spTgt spid="3">
-                                            <p:txEl>
-                                              <p:pRg st="2" end="2"/>
-                                            </p:txEl>
-                                          </p:spTgt>
-                                        </p:tgtEl>
-                                        <p:attrNameLst>
-                                          <p:attrName>style.visibility</p:attrName>
-                                        </p:attrNameLst>
-                                      </p:cBhvr>
-                                      <p:to>
-                                        <p:strVal val="visible"/>
-                                      </p:to>
-                                    </p:set>
-                                  </p:childTnLst>
-                                </p:cTn>
-                              </p:par>
-                              <p:par>
-                                <p:cTn id="13" presetID="1" presetClass="entr" presetSubtype="0" fill="hold" grpId="0" nodeType="withEffect">
+                                <p:cTn id="13" presetID="1" presetClass="entr" presetSubtype="0" fill="hold" grpId="0" nodeType="clickEffect">
                                   <p:stCondLst>
                                     <p:cond delay="0"/>
                                   </p:stCondLst>
@@ -5174,7 +6025,7 @@
                                         <p:tgtEl>
                                           <p:spTgt spid="3">
                                             <p:txEl>
-                                              <p:pRg st="3" end="3"/>
+                                              <p:pRg st="2" end="2"/>
                                             </p:txEl>
                                           </p:spTgt>
                                         </p:tgtEl>
@@ -5223,7 +6074,7 @@
 </p:sld>
 </file>
 
-<file path=ppt/slides/slide14.xml><?xml version="1.0" encoding="utf-8"?>
+<file path=ppt/slides/slide15.xml><?xml version="1.0" encoding="utf-8"?>
 <p:sld xmlns:a="http://schemas.openxmlformats.org/drawingml/2006/main" xmlns:r="http://schemas.openxmlformats.org/officeDocument/2006/relationships" xmlns:p="http://schemas.openxmlformats.org/presentationml/2006/main">
   <p:cSld>
     <p:spTree>
@@ -5292,7 +6143,7 @@
 </p:sld>
 </file>
 
-<file path=ppt/slides/slide15.xml><?xml version="1.0" encoding="utf-8"?>
+<file path=ppt/slides/slide16.xml><?xml version="1.0" encoding="utf-8"?>
 <p:sld xmlns:a="http://schemas.openxmlformats.org/drawingml/2006/main" xmlns:r="http://schemas.openxmlformats.org/officeDocument/2006/relationships" xmlns:p="http://schemas.openxmlformats.org/presentationml/2006/main">
   <p:cSld>
     <p:spTree>
@@ -5360,7 +6211,7 @@
 </p:sld>
 </file>
 
-<file path=ppt/slides/slide16.xml><?xml version="1.0" encoding="utf-8"?>
+<file path=ppt/slides/slide17.xml><?xml version="1.0" encoding="utf-8"?>
 <p:sld xmlns:a="http://schemas.openxmlformats.org/drawingml/2006/main" xmlns:r="http://schemas.openxmlformats.org/officeDocument/2006/relationships" xmlns:p="http://schemas.openxmlformats.org/presentationml/2006/main">
   <p:cSld>
     <p:spTree>
@@ -5828,7 +6679,7 @@
 </p:sld>
 </file>
 
-<file path=ppt/slides/slide17.xml><?xml version="1.0" encoding="utf-8"?>
+<file path=ppt/slides/slide18.xml><?xml version="1.0" encoding="utf-8"?>
 <p:sld xmlns:a="http://schemas.openxmlformats.org/drawingml/2006/main" xmlns:r="http://schemas.openxmlformats.org/officeDocument/2006/relationships" xmlns:p="http://schemas.openxmlformats.org/presentationml/2006/main">
   <p:cSld>
     <p:spTree>
@@ -5908,6 +6759,7 @@
               <a:rPr lang="cs-CZ" strike="sngStrike" dirty="0"/>
               <a:t>Vytvořit CookBook.BL.WEB.</a:t>
             </a:r>
+            <a:endParaRPr lang="en-US" strike="sngStrike" dirty="0"/>
           </a:p>
           <a:p>
             <a:pPr marL="914400" lvl="1" indent="-457200">
@@ -5916,7 +6768,7 @@
             </a:pPr>
             <a:r>
               <a:rPr lang="cs-CZ" strike="sngStrike" dirty="0"/>
-              <a:t>Vytvořit fasády.</a:t>
+              <a:t>Vygenerovat API klienty.</a:t>
             </a:r>
           </a:p>
           <a:p>
@@ -5926,7 +6778,7 @@
             </a:pPr>
             <a:r>
               <a:rPr lang="cs-CZ" strike="sngStrike" dirty="0"/>
-              <a:t>Vygenerovat API klienty.</a:t>
+              <a:t>Vytvořit fasády.</a:t>
             </a:r>
           </a:p>
           <a:p>
@@ -6008,7 +6860,7 @@
 </p:sld>
 </file>
 
-<file path=ppt/slides/slide18.xml><?xml version="1.0" encoding="utf-8"?>
+<file path=ppt/slides/slide19.xml><?xml version="1.0" encoding="utf-8"?>
 <p:sld xmlns:a="http://schemas.openxmlformats.org/drawingml/2006/main" xmlns:r="http://schemas.openxmlformats.org/officeDocument/2006/relationships" xmlns:p="http://schemas.openxmlformats.org/presentationml/2006/main">
   <p:cSld>
     <p:spTree>
@@ -6077,104 +6929,6 @@
 </p:sld>
 </file>
 
-<file path=ppt/slides/slide19.xml><?xml version="1.0" encoding="utf-8"?>
-<p:sld xmlns:a="http://schemas.openxmlformats.org/drawingml/2006/main" xmlns:r="http://schemas.openxmlformats.org/officeDocument/2006/relationships" xmlns:p="http://schemas.openxmlformats.org/presentationml/2006/main">
-  <p:cSld>
-    <p:spTree>
-      <p:nvGrpSpPr>
-        <p:cNvPr id="1" name=""/>
-        <p:cNvGrpSpPr/>
-        <p:nvPr/>
-      </p:nvGrpSpPr>
-      <p:grpSpPr>
-        <a:xfrm>
-          <a:off x="0" y="0"/>
-          <a:ext cx="0" cy="0"/>
-          <a:chOff x="0" y="0"/>
-          <a:chExt cx="0" cy="0"/>
-        </a:xfrm>
-      </p:grpSpPr>
-      <p:sp>
-        <p:nvSpPr>
-          <p:cNvPr id="2" name="Title 1">
-            <a:extLst>
-              <a:ext uri="{FF2B5EF4-FFF2-40B4-BE49-F238E27FC236}">
-                <a16:creationId xmlns:a16="http://schemas.microsoft.com/office/drawing/2014/main" id="{BA8F37EF-A3D8-4056-8964-41D89966779D}"/>
-              </a:ext>
-            </a:extLst>
-          </p:cNvPr>
-          <p:cNvSpPr>
-            <a:spLocks noGrp="1"/>
-          </p:cNvSpPr>
-          <p:nvPr>
-            <p:ph type="title"/>
-          </p:nvPr>
-        </p:nvSpPr>
-        <p:spPr/>
-        <p:txBody>
-          <a:bodyPr/>
-          <a:lstStyle/>
-          <a:p>
-            <a:r>
-              <a:rPr lang="en-US" dirty="0" err="1"/>
-              <a:t>Validace</a:t>
-            </a:r>
-            <a:endParaRPr lang="en-US" dirty="0"/>
-          </a:p>
-        </p:txBody>
-      </p:sp>
-      <p:pic>
-        <p:nvPicPr>
-          <p:cNvPr id="5" name="Picture 4" descr="A picture containing application&#10;&#10;Description automatically generated">
-            <a:extLst>
-              <a:ext uri="{FF2B5EF4-FFF2-40B4-BE49-F238E27FC236}">
-                <a16:creationId xmlns:a16="http://schemas.microsoft.com/office/drawing/2014/main" id="{E50434FC-B874-4F6B-9E30-1E6D1BE30BE7}"/>
-              </a:ext>
-            </a:extLst>
-          </p:cNvPr>
-          <p:cNvPicPr>
-            <a:picLocks noChangeAspect="1"/>
-          </p:cNvPicPr>
-          <p:nvPr/>
-        </p:nvPicPr>
-        <p:blipFill>
-          <a:blip r:embed="rId2">
-            <a:extLst>
-              <a:ext uri="{28A0092B-C50C-407E-A947-70E740481C1C}">
-                <a14:useLocalDpi xmlns:a14="http://schemas.microsoft.com/office/drawing/2010/main" val="0"/>
-              </a:ext>
-            </a:extLst>
-          </a:blip>
-          <a:stretch>
-            <a:fillRect/>
-          </a:stretch>
-        </p:blipFill>
-        <p:spPr>
-          <a:xfrm>
-            <a:off x="323850" y="1062037"/>
-            <a:ext cx="8496300" cy="4733925"/>
-          </a:xfrm>
-          <a:prstGeom prst="rect">
-            <a:avLst/>
-          </a:prstGeom>
-        </p:spPr>
-      </p:pic>
-    </p:spTree>
-    <p:extLst>
-      <p:ext uri="{BB962C8B-B14F-4D97-AF65-F5344CB8AC3E}">
-        <p14:creationId xmlns:p14="http://schemas.microsoft.com/office/powerpoint/2010/main" val="3301155098"/>
-      </p:ext>
-    </p:extLst>
-  </p:cSld>
-  <p:clrMapOvr>
-    <a:masterClrMapping/>
-  </p:clrMapOvr>
-  <p:transition spd="slow">
-    <p:push dir="u"/>
-  </p:transition>
-</p:sld>
-</file>
-
 <file path=ppt/slides/slide2.xml><?xml version="1.0" encoding="utf-8"?>
 <p:sld xmlns:a="http://schemas.openxmlformats.org/drawingml/2006/main" xmlns:r="http://schemas.openxmlformats.org/officeDocument/2006/relationships" xmlns:p="http://schemas.openxmlformats.org/presentationml/2006/main">
   <p:cSld>
@@ -6318,6 +7072,104 @@
         </p:nvSpPr>
         <p:spPr/>
         <p:txBody>
+          <a:bodyPr/>
+          <a:lstStyle/>
+          <a:p>
+            <a:r>
+              <a:rPr lang="en-US" dirty="0" err="1"/>
+              <a:t>Validace</a:t>
+            </a:r>
+            <a:endParaRPr lang="en-US" dirty="0"/>
+          </a:p>
+        </p:txBody>
+      </p:sp>
+      <p:pic>
+        <p:nvPicPr>
+          <p:cNvPr id="5" name="Picture 4" descr="A picture containing application&#10;&#10;Description automatically generated">
+            <a:extLst>
+              <a:ext uri="{FF2B5EF4-FFF2-40B4-BE49-F238E27FC236}">
+                <a16:creationId xmlns:a16="http://schemas.microsoft.com/office/drawing/2014/main" id="{E50434FC-B874-4F6B-9E30-1E6D1BE30BE7}"/>
+              </a:ext>
+            </a:extLst>
+          </p:cNvPr>
+          <p:cNvPicPr>
+            <a:picLocks noChangeAspect="1"/>
+          </p:cNvPicPr>
+          <p:nvPr/>
+        </p:nvPicPr>
+        <p:blipFill>
+          <a:blip r:embed="rId2">
+            <a:extLst>
+              <a:ext uri="{28A0092B-C50C-407E-A947-70E740481C1C}">
+                <a14:useLocalDpi xmlns:a14="http://schemas.microsoft.com/office/drawing/2010/main" val="0"/>
+              </a:ext>
+            </a:extLst>
+          </a:blip>
+          <a:stretch>
+            <a:fillRect/>
+          </a:stretch>
+        </p:blipFill>
+        <p:spPr>
+          <a:xfrm>
+            <a:off x="323850" y="1062037"/>
+            <a:ext cx="8496300" cy="4733925"/>
+          </a:xfrm>
+          <a:prstGeom prst="rect">
+            <a:avLst/>
+          </a:prstGeom>
+        </p:spPr>
+      </p:pic>
+    </p:spTree>
+    <p:extLst>
+      <p:ext uri="{BB962C8B-B14F-4D97-AF65-F5344CB8AC3E}">
+        <p14:creationId xmlns:p14="http://schemas.microsoft.com/office/powerpoint/2010/main" val="3301155098"/>
+      </p:ext>
+    </p:extLst>
+  </p:cSld>
+  <p:clrMapOvr>
+    <a:masterClrMapping/>
+  </p:clrMapOvr>
+  <p:transition spd="slow">
+    <p:push dir="u"/>
+  </p:transition>
+</p:sld>
+</file>
+
+<file path=ppt/slides/slide21.xml><?xml version="1.0" encoding="utf-8"?>
+<p:sld xmlns:a="http://schemas.openxmlformats.org/drawingml/2006/main" xmlns:r="http://schemas.openxmlformats.org/officeDocument/2006/relationships" xmlns:p="http://schemas.openxmlformats.org/presentationml/2006/main">
+  <p:cSld>
+    <p:spTree>
+      <p:nvGrpSpPr>
+        <p:cNvPr id="1" name=""/>
+        <p:cNvGrpSpPr/>
+        <p:nvPr/>
+      </p:nvGrpSpPr>
+      <p:grpSpPr>
+        <a:xfrm>
+          <a:off x="0" y="0"/>
+          <a:ext cx="0" cy="0"/>
+          <a:chOff x="0" y="0"/>
+          <a:chExt cx="0" cy="0"/>
+        </a:xfrm>
+      </p:grpSpPr>
+      <p:sp>
+        <p:nvSpPr>
+          <p:cNvPr id="2" name="Title 1">
+            <a:extLst>
+              <a:ext uri="{FF2B5EF4-FFF2-40B4-BE49-F238E27FC236}">
+                <a16:creationId xmlns:a16="http://schemas.microsoft.com/office/drawing/2014/main" id="{BA8F37EF-A3D8-4056-8964-41D89966779D}"/>
+              </a:ext>
+            </a:extLst>
+          </p:cNvPr>
+          <p:cNvSpPr>
+            <a:spLocks noGrp="1"/>
+          </p:cNvSpPr>
+          <p:nvPr>
+            <p:ph type="title"/>
+          </p:nvPr>
+        </p:nvSpPr>
+        <p:spPr/>
+        <p:txBody>
           <a:bodyPr>
             <a:normAutofit/>
           </a:bodyPr>
@@ -6380,7 +7232,7 @@
 </p:sld>
 </file>
 
-<file path=ppt/slides/slide21.xml><?xml version="1.0" encoding="utf-8"?>
+<file path=ppt/slides/slide22.xml><?xml version="1.0" encoding="utf-8"?>
 <p:sld xmlns:a="http://schemas.openxmlformats.org/drawingml/2006/main" xmlns:r="http://schemas.openxmlformats.org/officeDocument/2006/relationships" xmlns:p="http://schemas.openxmlformats.org/presentationml/2006/main">
   <p:cSld>
     <p:spTree>
@@ -6477,7 +7329,7 @@
 </p:sld>
 </file>
 
-<file path=ppt/slides/slide22.xml><?xml version="1.0" encoding="utf-8"?>
+<file path=ppt/slides/slide23.xml><?xml version="1.0" encoding="utf-8"?>
 <p:sld xmlns:a="http://schemas.openxmlformats.org/drawingml/2006/main" xmlns:r="http://schemas.openxmlformats.org/officeDocument/2006/relationships" xmlns:p="http://schemas.openxmlformats.org/presentationml/2006/main">
   <p:cSld>
     <p:spTree>
@@ -6546,218 +7398,6 @@
 </p:sld>
 </file>
 
-<file path=ppt/slides/slide23.xml><?xml version="1.0" encoding="utf-8"?>
-<p:sld xmlns:a="http://schemas.openxmlformats.org/drawingml/2006/main" xmlns:r="http://schemas.openxmlformats.org/officeDocument/2006/relationships" xmlns:p="http://schemas.openxmlformats.org/presentationml/2006/main">
-  <p:cSld>
-    <p:spTree>
-      <p:nvGrpSpPr>
-        <p:cNvPr id="1" name=""/>
-        <p:cNvGrpSpPr/>
-        <p:nvPr/>
-      </p:nvGrpSpPr>
-      <p:grpSpPr>
-        <a:xfrm>
-          <a:off x="0" y="0"/>
-          <a:ext cx="0" cy="0"/>
-          <a:chOff x="0" y="0"/>
-          <a:chExt cx="0" cy="0"/>
-        </a:xfrm>
-      </p:grpSpPr>
-      <p:sp>
-        <p:nvSpPr>
-          <p:cNvPr id="2" name="Title 1">
-            <a:extLst>
-              <a:ext uri="{FF2B5EF4-FFF2-40B4-BE49-F238E27FC236}">
-                <a16:creationId xmlns:a16="http://schemas.microsoft.com/office/drawing/2014/main" id="{50C6F60E-D0FA-42BA-99A2-8B0ADADF16F2}"/>
-              </a:ext>
-            </a:extLst>
-          </p:cNvPr>
-          <p:cNvSpPr>
-            <a:spLocks noGrp="1"/>
-          </p:cNvSpPr>
-          <p:nvPr>
-            <p:ph type="title"/>
-          </p:nvPr>
-        </p:nvSpPr>
-        <p:spPr/>
-        <p:txBody>
-          <a:bodyPr/>
-          <a:lstStyle/>
-          <a:p>
-            <a:r>
-              <a:rPr lang="cs-CZ" dirty="0"/>
-              <a:t>Postup napojení na backend</a:t>
-            </a:r>
-            <a:endParaRPr lang="en-US" dirty="0"/>
-          </a:p>
-        </p:txBody>
-      </p:sp>
-      <p:sp>
-        <p:nvSpPr>
-          <p:cNvPr id="3" name="Content Placeholder 2">
-            <a:extLst>
-              <a:ext uri="{FF2B5EF4-FFF2-40B4-BE49-F238E27FC236}">
-                <a16:creationId xmlns:a16="http://schemas.microsoft.com/office/drawing/2014/main" id="{8D065E49-B560-4649-8800-3AD602721431}"/>
-              </a:ext>
-            </a:extLst>
-          </p:cNvPr>
-          <p:cNvSpPr>
-            <a:spLocks noGrp="1"/>
-          </p:cNvSpPr>
-          <p:nvPr>
-            <p:ph idx="1"/>
-          </p:nvPr>
-        </p:nvSpPr>
-        <p:spPr>
-          <a:xfrm>
-            <a:off x="251520" y="1268761"/>
-            <a:ext cx="8892480" cy="4857404"/>
-          </a:xfrm>
-        </p:spPr>
-        <p:txBody>
-          <a:bodyPr/>
-          <a:lstStyle/>
-          <a:p>
-            <a:pPr marL="457200" indent="-457200">
-              <a:buFont typeface="+mj-lt"/>
-              <a:buAutoNum type="arabicPeriod"/>
-            </a:pPr>
-            <a:r>
-              <a:rPr lang="cs-CZ" strike="sngStrike" dirty="0"/>
-              <a:t>Vytvořit CookBook.BL.WEB.</a:t>
-            </a:r>
-          </a:p>
-          <a:p>
-            <a:pPr marL="914400" lvl="1" indent="-457200">
-              <a:buFont typeface="+mj-lt"/>
-              <a:buAutoNum type="arabicPeriod"/>
-            </a:pPr>
-            <a:r>
-              <a:rPr lang="cs-CZ" strike="sngStrike" dirty="0"/>
-              <a:t>Vytvořit fasády.</a:t>
-            </a:r>
-          </a:p>
-          <a:p>
-            <a:pPr marL="914400" lvl="1" indent="-457200">
-              <a:buFont typeface="+mj-lt"/>
-              <a:buAutoNum type="arabicPeriod"/>
-            </a:pPr>
-            <a:r>
-              <a:rPr lang="cs-CZ" strike="sngStrike" dirty="0"/>
-              <a:t>Vygenerovat API klienty.</a:t>
-            </a:r>
-          </a:p>
-          <a:p>
-            <a:pPr marL="457200" indent="-457200">
-              <a:buFont typeface="+mj-lt"/>
-              <a:buAutoNum type="arabicPeriod"/>
-            </a:pPr>
-            <a:r>
-              <a:rPr lang="cs-CZ" strike="sngStrike" dirty="0"/>
-              <a:t>Nastavit WEB tak aby komunikoval s API</a:t>
-            </a:r>
-            <a:r>
-              <a:rPr lang="en-US" strike="sngStrike" dirty="0"/>
-              <a:t>.</a:t>
-            </a:r>
-            <a:endParaRPr lang="cs-CZ" strike="sngStrike" dirty="0"/>
-          </a:p>
-          <a:p>
-            <a:pPr marL="457200" indent="-457200">
-              <a:buFont typeface="+mj-lt"/>
-              <a:buAutoNum type="arabicPeriod"/>
-            </a:pPr>
-            <a:r>
-              <a:rPr lang="cs-CZ" strike="sngStrike" dirty="0"/>
-              <a:t>Zajistit aby uživatel nemohl posílat na API nevalidní data.</a:t>
-            </a:r>
-            <a:br>
-              <a:rPr lang="cs-CZ" strike="sngStrike" dirty="0"/>
-            </a:br>
-            <a:r>
-              <a:rPr lang="en-US" strike="sngStrike" dirty="0"/>
-              <a:t>(VALIDACE)</a:t>
-            </a:r>
-          </a:p>
-          <a:p>
-            <a:pPr marL="457200" indent="-457200">
-              <a:buFont typeface="+mj-lt"/>
-              <a:buAutoNum type="arabicPeriod"/>
-            </a:pPr>
-            <a:r>
-              <a:rPr lang="en-US" dirty="0" err="1"/>
-              <a:t>Zajistit</a:t>
-            </a:r>
-            <a:r>
-              <a:rPr lang="en-US" dirty="0"/>
-              <a:t> </a:t>
-            </a:r>
-            <a:r>
-              <a:rPr lang="en-US" dirty="0" err="1"/>
-              <a:t>spr</a:t>
-            </a:r>
-            <a:r>
-              <a:rPr lang="cs-CZ" dirty="0"/>
-              <a:t>ávnou reakci WEBu na chyby.</a:t>
-            </a:r>
-          </a:p>
-          <a:p>
-            <a:endParaRPr lang="cs-CZ" dirty="0"/>
-          </a:p>
-          <a:p>
-            <a:r>
-              <a:rPr lang="cs-CZ" dirty="0"/>
-              <a:t>Bonus feature</a:t>
-            </a:r>
-            <a:r>
-              <a:rPr lang="en-US" dirty="0"/>
-              <a:t>:</a:t>
-            </a:r>
-            <a:br>
-              <a:rPr lang="en-US" dirty="0"/>
-            </a:br>
-            <a:r>
-              <a:rPr lang="en-US" dirty="0"/>
-              <a:t>5. </a:t>
-            </a:r>
-            <a:r>
-              <a:rPr lang="en-US" dirty="0" err="1"/>
-              <a:t>Lokalizace</a:t>
-            </a:r>
-            <a:endParaRPr lang="cs-CZ" dirty="0"/>
-          </a:p>
-          <a:p>
-            <a:pPr marL="914400" lvl="1" indent="-457200">
-              <a:buFont typeface="+mj-lt"/>
-              <a:buAutoNum type="arabicPeriod"/>
-            </a:pPr>
-            <a:endParaRPr lang="cs-CZ" dirty="0"/>
-          </a:p>
-          <a:p>
-            <a:pPr marL="457200" indent="-457200">
-              <a:buFont typeface="+mj-lt"/>
-              <a:buAutoNum type="arabicPeriod"/>
-            </a:pPr>
-            <a:endParaRPr lang="en-US" dirty="0"/>
-          </a:p>
-        </p:txBody>
-      </p:sp>
-    </p:spTree>
-    <p:extLst>
-      <p:ext uri="{BB962C8B-B14F-4D97-AF65-F5344CB8AC3E}">
-        <p14:creationId xmlns:p14="http://schemas.microsoft.com/office/powerpoint/2010/main" val="1239971735"/>
-      </p:ext>
-    </p:extLst>
-  </p:cSld>
-  <p:clrMapOvr>
-    <a:masterClrMapping/>
-  </p:clrMapOvr>
-  <p:transition spd="slow">
-    <p:push dir="u"/>
-  </p:transition>
-</p:sld>
-</file>
-
 <file path=ppt/slides/slide24.xml><?xml version="1.0" encoding="utf-8"?>
 <p:sld xmlns:a="http://schemas.openxmlformats.org/drawingml/2006/main" xmlns:r="http://schemas.openxmlformats.org/officeDocument/2006/relationships" xmlns:p="http://schemas.openxmlformats.org/presentationml/2006/main">
   <p:cSld>
@@ -6780,6 +7420,219 @@
           <p:cNvPr id="2" name="Title 1">
             <a:extLst>
               <a:ext uri="{FF2B5EF4-FFF2-40B4-BE49-F238E27FC236}">
+                <a16:creationId xmlns:a16="http://schemas.microsoft.com/office/drawing/2014/main" id="{50C6F60E-D0FA-42BA-99A2-8B0ADADF16F2}"/>
+              </a:ext>
+            </a:extLst>
+          </p:cNvPr>
+          <p:cNvSpPr>
+            <a:spLocks noGrp="1"/>
+          </p:cNvSpPr>
+          <p:nvPr>
+            <p:ph type="title"/>
+          </p:nvPr>
+        </p:nvSpPr>
+        <p:spPr/>
+        <p:txBody>
+          <a:bodyPr/>
+          <a:lstStyle/>
+          <a:p>
+            <a:r>
+              <a:rPr lang="cs-CZ" dirty="0"/>
+              <a:t>Postup napojení na backend</a:t>
+            </a:r>
+            <a:endParaRPr lang="en-US" dirty="0"/>
+          </a:p>
+        </p:txBody>
+      </p:sp>
+      <p:sp>
+        <p:nvSpPr>
+          <p:cNvPr id="3" name="Content Placeholder 2">
+            <a:extLst>
+              <a:ext uri="{FF2B5EF4-FFF2-40B4-BE49-F238E27FC236}">
+                <a16:creationId xmlns:a16="http://schemas.microsoft.com/office/drawing/2014/main" id="{8D065E49-B560-4649-8800-3AD602721431}"/>
+              </a:ext>
+            </a:extLst>
+          </p:cNvPr>
+          <p:cNvSpPr>
+            <a:spLocks noGrp="1"/>
+          </p:cNvSpPr>
+          <p:nvPr>
+            <p:ph idx="1"/>
+          </p:nvPr>
+        </p:nvSpPr>
+        <p:spPr>
+          <a:xfrm>
+            <a:off x="251520" y="1268761"/>
+            <a:ext cx="8892480" cy="4857404"/>
+          </a:xfrm>
+        </p:spPr>
+        <p:txBody>
+          <a:bodyPr/>
+          <a:lstStyle/>
+          <a:p>
+            <a:pPr marL="457200" indent="-457200">
+              <a:buFont typeface="+mj-lt"/>
+              <a:buAutoNum type="arabicPeriod"/>
+            </a:pPr>
+            <a:r>
+              <a:rPr lang="cs-CZ" strike="sngStrike" dirty="0"/>
+              <a:t>Vytvořit CookBook.BL.WEB.</a:t>
+            </a:r>
+            <a:endParaRPr lang="en-US" strike="sngStrike" dirty="0"/>
+          </a:p>
+          <a:p>
+            <a:pPr marL="914400" lvl="1" indent="-457200">
+              <a:buFont typeface="+mj-lt"/>
+              <a:buAutoNum type="arabicPeriod"/>
+            </a:pPr>
+            <a:r>
+              <a:rPr lang="cs-CZ" strike="sngStrike" dirty="0"/>
+              <a:t>Vygenerovat API klienty.</a:t>
+            </a:r>
+          </a:p>
+          <a:p>
+            <a:pPr marL="914400" lvl="1" indent="-457200">
+              <a:buFont typeface="+mj-lt"/>
+              <a:buAutoNum type="arabicPeriod"/>
+            </a:pPr>
+            <a:r>
+              <a:rPr lang="cs-CZ" strike="sngStrike" dirty="0"/>
+              <a:t>Vytvořit fasády.</a:t>
+            </a:r>
+          </a:p>
+          <a:p>
+            <a:pPr marL="457200" indent="-457200">
+              <a:buFont typeface="+mj-lt"/>
+              <a:buAutoNum type="arabicPeriod"/>
+            </a:pPr>
+            <a:r>
+              <a:rPr lang="cs-CZ" strike="sngStrike" dirty="0"/>
+              <a:t>Nastavit WEB tak aby komunikoval s API</a:t>
+            </a:r>
+            <a:r>
+              <a:rPr lang="en-US" strike="sngStrike" dirty="0"/>
+              <a:t>.</a:t>
+            </a:r>
+            <a:endParaRPr lang="cs-CZ" strike="sngStrike" dirty="0"/>
+          </a:p>
+          <a:p>
+            <a:pPr marL="457200" indent="-457200">
+              <a:buFont typeface="+mj-lt"/>
+              <a:buAutoNum type="arabicPeriod"/>
+            </a:pPr>
+            <a:r>
+              <a:rPr lang="cs-CZ" strike="sngStrike" dirty="0"/>
+              <a:t>Zajistit aby uživatel nemohl posílat na API nevalidní data.</a:t>
+            </a:r>
+            <a:br>
+              <a:rPr lang="cs-CZ" strike="sngStrike" dirty="0"/>
+            </a:br>
+            <a:r>
+              <a:rPr lang="en-US" strike="sngStrike" dirty="0"/>
+              <a:t>(VALIDACE)</a:t>
+            </a:r>
+          </a:p>
+          <a:p>
+            <a:pPr marL="457200" indent="-457200">
+              <a:buFont typeface="+mj-lt"/>
+              <a:buAutoNum type="arabicPeriod"/>
+            </a:pPr>
+            <a:r>
+              <a:rPr lang="en-US" dirty="0" err="1"/>
+              <a:t>Zajistit</a:t>
+            </a:r>
+            <a:r>
+              <a:rPr lang="en-US" dirty="0"/>
+              <a:t> </a:t>
+            </a:r>
+            <a:r>
+              <a:rPr lang="en-US" dirty="0" err="1"/>
+              <a:t>spr</a:t>
+            </a:r>
+            <a:r>
+              <a:rPr lang="cs-CZ" dirty="0"/>
+              <a:t>ávnou reakci WEBu na chyby.</a:t>
+            </a:r>
+          </a:p>
+          <a:p>
+            <a:endParaRPr lang="cs-CZ" dirty="0"/>
+          </a:p>
+          <a:p>
+            <a:r>
+              <a:rPr lang="cs-CZ" dirty="0"/>
+              <a:t>Bonus feature</a:t>
+            </a:r>
+            <a:r>
+              <a:rPr lang="en-US" dirty="0"/>
+              <a:t>:</a:t>
+            </a:r>
+            <a:br>
+              <a:rPr lang="en-US" dirty="0"/>
+            </a:br>
+            <a:r>
+              <a:rPr lang="en-US" dirty="0"/>
+              <a:t>5. </a:t>
+            </a:r>
+            <a:r>
+              <a:rPr lang="en-US" dirty="0" err="1"/>
+              <a:t>Lokalizace</a:t>
+            </a:r>
+            <a:endParaRPr lang="cs-CZ" dirty="0"/>
+          </a:p>
+          <a:p>
+            <a:pPr marL="914400" lvl="1" indent="-457200">
+              <a:buFont typeface="+mj-lt"/>
+              <a:buAutoNum type="arabicPeriod"/>
+            </a:pPr>
+            <a:endParaRPr lang="cs-CZ" dirty="0"/>
+          </a:p>
+          <a:p>
+            <a:pPr marL="457200" indent="-457200">
+              <a:buFont typeface="+mj-lt"/>
+              <a:buAutoNum type="arabicPeriod"/>
+            </a:pPr>
+            <a:endParaRPr lang="en-US" dirty="0"/>
+          </a:p>
+        </p:txBody>
+      </p:sp>
+    </p:spTree>
+    <p:extLst>
+      <p:ext uri="{BB962C8B-B14F-4D97-AF65-F5344CB8AC3E}">
+        <p14:creationId xmlns:p14="http://schemas.microsoft.com/office/powerpoint/2010/main" val="1239971735"/>
+      </p:ext>
+    </p:extLst>
+  </p:cSld>
+  <p:clrMapOvr>
+    <a:masterClrMapping/>
+  </p:clrMapOvr>
+  <p:transition spd="slow">
+    <p:push dir="u"/>
+  </p:transition>
+</p:sld>
+</file>
+
+<file path=ppt/slides/slide25.xml><?xml version="1.0" encoding="utf-8"?>
+<p:sld xmlns:a="http://schemas.openxmlformats.org/drawingml/2006/main" xmlns:r="http://schemas.openxmlformats.org/officeDocument/2006/relationships" xmlns:p="http://schemas.openxmlformats.org/presentationml/2006/main">
+  <p:cSld>
+    <p:spTree>
+      <p:nvGrpSpPr>
+        <p:cNvPr id="1" name=""/>
+        <p:cNvGrpSpPr/>
+        <p:nvPr/>
+      </p:nvGrpSpPr>
+      <p:grpSpPr>
+        <a:xfrm>
+          <a:off x="0" y="0"/>
+          <a:ext cx="0" cy="0"/>
+          <a:chOff x="0" y="0"/>
+          <a:chExt cx="0" cy="0"/>
+        </a:xfrm>
+      </p:grpSpPr>
+      <p:sp>
+        <p:nvSpPr>
+          <p:cNvPr id="2" name="Title 1">
+            <a:extLst>
+              <a:ext uri="{FF2B5EF4-FFF2-40B4-BE49-F238E27FC236}">
                 <a16:creationId xmlns:a16="http://schemas.microsoft.com/office/drawing/2014/main" id="{C6A426FE-FA3B-4652-95C0-D6FF6A8C72A3}"/>
               </a:ext>
             </a:extLst>
@@ -6827,7 +7680,7 @@
 </p:sld>
 </file>
 
-<file path=ppt/slides/slide25.xml><?xml version="1.0" encoding="utf-8"?>
+<file path=ppt/slides/slide26.xml><?xml version="1.0" encoding="utf-8"?>
 <p:sld xmlns:a="http://schemas.openxmlformats.org/drawingml/2006/main" xmlns:r="http://schemas.openxmlformats.org/officeDocument/2006/relationships" xmlns:p="http://schemas.openxmlformats.org/presentationml/2006/main">
   <p:cSld>
     <p:spTree>
@@ -6896,7 +7749,7 @@
 </p:sld>
 </file>
 
-<file path=ppt/slides/slide26.xml><?xml version="1.0" encoding="utf-8"?>
+<file path=ppt/slides/slide27.xml><?xml version="1.0" encoding="utf-8"?>
 <p:sld xmlns:a="http://schemas.openxmlformats.org/drawingml/2006/main" xmlns:r="http://schemas.openxmlformats.org/officeDocument/2006/relationships" xmlns:p="http://schemas.openxmlformats.org/presentationml/2006/main">
   <p:cSld>
     <p:spTree>
@@ -6976,6 +7829,7 @@
               <a:rPr lang="cs-CZ" strike="sngStrike" dirty="0"/>
               <a:t>Vytvořit CookBook.BL.WEB.</a:t>
             </a:r>
+            <a:endParaRPr lang="en-US" strike="sngStrike" dirty="0"/>
           </a:p>
           <a:p>
             <a:pPr marL="914400" lvl="1" indent="-457200">
@@ -6984,7 +7838,7 @@
             </a:pPr>
             <a:r>
               <a:rPr lang="cs-CZ" strike="sngStrike" dirty="0"/>
-              <a:t>Vytvořit fasády.</a:t>
+              <a:t>Vygenerovat API klienty.</a:t>
             </a:r>
           </a:p>
           <a:p>
@@ -6994,7 +7848,7 @@
             </a:pPr>
             <a:r>
               <a:rPr lang="cs-CZ" strike="sngStrike" dirty="0"/>
-              <a:t>Vygenerovat API klienty.</a:t>
+              <a:t>Vytvořit fasády.</a:t>
             </a:r>
           </a:p>
           <a:p>
@@ -7070,7 +7924,7 @@
 </p:sld>
 </file>
 
-<file path=ppt/slides/slide27.xml><?xml version="1.0" encoding="utf-8"?>
+<file path=ppt/slides/slide28.xml><?xml version="1.0" encoding="utf-8"?>
 <p:sld xmlns:a="http://schemas.openxmlformats.org/drawingml/2006/main" xmlns:r="http://schemas.openxmlformats.org/officeDocument/2006/relationships" xmlns:p="http://schemas.openxmlformats.org/presentationml/2006/main">
   <p:cSld>
     <p:spTree>
@@ -7139,7 +7993,7 @@
 </p:sld>
 </file>
 
-<file path=ppt/slides/slide28.xml><?xml version="1.0" encoding="utf-8"?>
+<file path=ppt/slides/slide29.xml><?xml version="1.0" encoding="utf-8"?>
 <p:sld xmlns:a="http://schemas.openxmlformats.org/drawingml/2006/main" xmlns:r="http://schemas.openxmlformats.org/officeDocument/2006/relationships" xmlns:p="http://schemas.openxmlformats.org/presentationml/2006/main">
   <p:cSld>
     <p:spTree>
@@ -7219,6 +8073,53 @@
               <a:rPr lang="cs-CZ" strike="sngStrike" dirty="0"/>
               <a:t>Vytvořit CookBook.BL.WEB.</a:t>
             </a:r>
+            <a:endParaRPr lang="en-US" strike="sngStrike" dirty="0"/>
+          </a:p>
+          <a:p>
+            <a:pPr marL="914400" lvl="1" indent="-457200">
+              <a:buFont typeface="+mj-lt"/>
+              <a:buAutoNum type="arabicPeriod"/>
+            </a:pPr>
+            <a:r>
+              <a:rPr lang="cs-CZ" strike="sngStrike" dirty="0"/>
+              <a:t>Vygenerovat API klienty.</a:t>
+            </a:r>
+            <a:br>
+              <a:rPr lang="cs-CZ" strike="sngStrike" dirty="0"/>
+            </a:br>
+            <a:r>
+              <a:rPr lang="cs-CZ" b="1" dirty="0">
+                <a:solidFill>
+                  <a:srgbClr val="FF0000"/>
+                </a:solidFill>
+              </a:rPr>
+              <a:t>Vygenerované ze swagger definice pomocí</a:t>
+            </a:r>
+            <a:r>
+              <a:rPr lang="en-US" b="1" dirty="0">
+                <a:solidFill>
+                  <a:srgbClr val="FF0000"/>
+                </a:solidFill>
+              </a:rPr>
+              <a:t> nap</a:t>
+            </a:r>
+            <a:r>
+              <a:rPr lang="cs-CZ" b="1">
+                <a:solidFill>
+                  <a:srgbClr val="FF0000"/>
+                </a:solidFill>
+              </a:rPr>
+              <a:t>ř. </a:t>
+            </a:r>
+            <a:r>
+              <a:rPr lang="cs-CZ" b="1" dirty="0">
+                <a:solidFill>
+                  <a:srgbClr val="FF0000"/>
+                </a:solidFill>
+              </a:rPr>
+              <a:t>Nswag studia.</a:t>
+            </a:r>
+            <a:endParaRPr lang="cs-CZ" strike="sngStrike" dirty="0"/>
           </a:p>
           <a:p>
             <a:pPr marL="914400" lvl="1" indent="-457200">
@@ -7251,32 +8152,6 @@
                 </a:solidFill>
               </a:rPr>
               <a:t>řídy v BL schovávající vnitřní komplexitu.</a:t>
-            </a:r>
-            <a:endParaRPr lang="cs-CZ" b="1" strike="sngStrike" dirty="0">
-              <a:solidFill>
-                <a:srgbClr val="FF0000"/>
-              </a:solidFill>
-            </a:endParaRPr>
-          </a:p>
-          <a:p>
-            <a:pPr marL="914400" lvl="1" indent="-457200">
-              <a:buFont typeface="+mj-lt"/>
-              <a:buAutoNum type="arabicPeriod"/>
-            </a:pPr>
-            <a:r>
-              <a:rPr lang="cs-CZ" strike="sngStrike" dirty="0"/>
-              <a:t>Vygenerovat API klienty.</a:t>
-            </a:r>
-            <a:br>
-              <a:rPr lang="cs-CZ" strike="sngStrike" dirty="0"/>
-            </a:br>
-            <a:r>
-              <a:rPr lang="cs-CZ" b="1" dirty="0">
-                <a:solidFill>
-                  <a:srgbClr val="FF0000"/>
-                </a:solidFill>
-              </a:rPr>
-              <a:t>Vygenerované ze swagger definice pomocí Nswag studia.</a:t>
             </a:r>
             <a:endParaRPr lang="cs-CZ" b="1" strike="sngStrike" dirty="0">
               <a:solidFill>
@@ -7437,7 +8312,111 @@
 </p:sld>
 </file>
 
-<file path=ppt/slides/slide29.xml><?xml version="1.0" encoding="utf-8"?>
+<file path=ppt/slides/slide3.xml><?xml version="1.0" encoding="utf-8"?>
+<p:sld xmlns:a="http://schemas.openxmlformats.org/drawingml/2006/main" xmlns:r="http://schemas.openxmlformats.org/officeDocument/2006/relationships" xmlns:p="http://schemas.openxmlformats.org/presentationml/2006/main">
+  <p:cSld>
+    <p:spTree>
+      <p:nvGrpSpPr>
+        <p:cNvPr id="1" name=""/>
+        <p:cNvGrpSpPr/>
+        <p:nvPr/>
+      </p:nvGrpSpPr>
+      <p:grpSpPr>
+        <a:xfrm>
+          <a:off x="0" y="0"/>
+          <a:ext cx="0" cy="0"/>
+          <a:chOff x="0" y="0"/>
+          <a:chExt cx="0" cy="0"/>
+        </a:xfrm>
+      </p:grpSpPr>
+      <p:pic>
+        <p:nvPicPr>
+          <p:cNvPr id="5" name="Content Placeholder 4">
+            <a:extLst>
+              <a:ext uri="{FF2B5EF4-FFF2-40B4-BE49-F238E27FC236}">
+                <a16:creationId xmlns:a16="http://schemas.microsoft.com/office/drawing/2014/main" id="{15542F7D-B012-4A25-9433-2A5498A880A9}"/>
+              </a:ext>
+            </a:extLst>
+          </p:cNvPr>
+          <p:cNvPicPr>
+            <a:picLocks noGrp="1" noChangeAspect="1"/>
+          </p:cNvPicPr>
+          <p:nvPr>
+            <p:ph idx="1"/>
+          </p:nvPr>
+        </p:nvPicPr>
+        <p:blipFill>
+          <a:blip r:embed="rId2">
+            <a:extLst>
+              <a:ext uri="{28A0092B-C50C-407E-A947-70E740481C1C}">
+                <a14:useLocalDpi xmlns:a14="http://schemas.microsoft.com/office/drawing/2010/main" val="0"/>
+              </a:ext>
+            </a:extLst>
+          </a:blip>
+          <a:srcRect/>
+          <a:stretch/>
+        </p:blipFill>
+        <p:spPr>
+          <a:xfrm>
+            <a:off x="2201564" y="476672"/>
+            <a:ext cx="4452840" cy="5618505"/>
+          </a:xfrm>
+          <a:noFill/>
+        </p:spPr>
+      </p:pic>
+      <p:sp>
+        <p:nvSpPr>
+          <p:cNvPr id="7" name="Title 1">
+            <a:extLst>
+              <a:ext uri="{FF2B5EF4-FFF2-40B4-BE49-F238E27FC236}">
+                <a16:creationId xmlns:a16="http://schemas.microsoft.com/office/drawing/2014/main" id="{F06F05DE-C6B5-45B3-873A-5C0C210C6181}"/>
+              </a:ext>
+            </a:extLst>
+          </p:cNvPr>
+          <p:cNvSpPr>
+            <a:spLocks noGrp="1"/>
+          </p:cNvSpPr>
+          <p:nvPr>
+            <p:ph type="title"/>
+          </p:nvPr>
+        </p:nvSpPr>
+        <p:spPr>
+          <a:xfrm>
+            <a:off x="457200" y="188640"/>
+            <a:ext cx="8229600" cy="850105"/>
+          </a:xfrm>
+        </p:spPr>
+        <p:txBody>
+          <a:bodyPr anchor="ctr">
+            <a:normAutofit/>
+          </a:bodyPr>
+          <a:lstStyle/>
+          <a:p>
+            <a:r>
+              <a:rPr lang="cs-CZ" dirty="0"/>
+              <a:t>Cílový stav	</a:t>
+            </a:r>
+            <a:endParaRPr lang="sk-SK" dirty="0"/>
+          </a:p>
+        </p:txBody>
+      </p:sp>
+    </p:spTree>
+    <p:extLst>
+      <p:ext uri="{BB962C8B-B14F-4D97-AF65-F5344CB8AC3E}">
+        <p14:creationId xmlns:p14="http://schemas.microsoft.com/office/powerpoint/2010/main" val="4263751268"/>
+      </p:ext>
+    </p:extLst>
+  </p:cSld>
+  <p:clrMapOvr>
+    <a:masterClrMapping/>
+  </p:clrMapOvr>
+  <p:transition spd="slow">
+    <p:push dir="u"/>
+  </p:transition>
+</p:sld>
+</file>
+
+<file path=ppt/slides/slide30.xml><?xml version="1.0" encoding="utf-8"?>
 <p:sld xmlns:a="http://schemas.openxmlformats.org/drawingml/2006/main" xmlns:r="http://schemas.openxmlformats.org/officeDocument/2006/relationships" xmlns:p="http://schemas.openxmlformats.org/presentationml/2006/main">
   <p:cSld>
     <p:bg>
@@ -7978,110 +8957,6 @@
 </p:sld>
 </file>
 
-<file path=ppt/slides/slide3.xml><?xml version="1.0" encoding="utf-8"?>
-<p:sld xmlns:a="http://schemas.openxmlformats.org/drawingml/2006/main" xmlns:r="http://schemas.openxmlformats.org/officeDocument/2006/relationships" xmlns:p="http://schemas.openxmlformats.org/presentationml/2006/main">
-  <p:cSld>
-    <p:spTree>
-      <p:nvGrpSpPr>
-        <p:cNvPr id="1" name=""/>
-        <p:cNvGrpSpPr/>
-        <p:nvPr/>
-      </p:nvGrpSpPr>
-      <p:grpSpPr>
-        <a:xfrm>
-          <a:off x="0" y="0"/>
-          <a:ext cx="0" cy="0"/>
-          <a:chOff x="0" y="0"/>
-          <a:chExt cx="0" cy="0"/>
-        </a:xfrm>
-      </p:grpSpPr>
-      <p:pic>
-        <p:nvPicPr>
-          <p:cNvPr id="5" name="Content Placeholder 4">
-            <a:extLst>
-              <a:ext uri="{FF2B5EF4-FFF2-40B4-BE49-F238E27FC236}">
-                <a16:creationId xmlns:a16="http://schemas.microsoft.com/office/drawing/2014/main" id="{15542F7D-B012-4A25-9433-2A5498A880A9}"/>
-              </a:ext>
-            </a:extLst>
-          </p:cNvPr>
-          <p:cNvPicPr>
-            <a:picLocks noGrp="1" noChangeAspect="1"/>
-          </p:cNvPicPr>
-          <p:nvPr>
-            <p:ph idx="1"/>
-          </p:nvPr>
-        </p:nvPicPr>
-        <p:blipFill>
-          <a:blip r:embed="rId2">
-            <a:extLst>
-              <a:ext uri="{28A0092B-C50C-407E-A947-70E740481C1C}">
-                <a14:useLocalDpi xmlns:a14="http://schemas.microsoft.com/office/drawing/2010/main" val="0"/>
-              </a:ext>
-            </a:extLst>
-          </a:blip>
-          <a:srcRect/>
-          <a:stretch/>
-        </p:blipFill>
-        <p:spPr>
-          <a:xfrm>
-            <a:off x="2201564" y="476672"/>
-            <a:ext cx="4452840" cy="5618505"/>
-          </a:xfrm>
-          <a:noFill/>
-        </p:spPr>
-      </p:pic>
-      <p:sp>
-        <p:nvSpPr>
-          <p:cNvPr id="7" name="Title 1">
-            <a:extLst>
-              <a:ext uri="{FF2B5EF4-FFF2-40B4-BE49-F238E27FC236}">
-                <a16:creationId xmlns:a16="http://schemas.microsoft.com/office/drawing/2014/main" id="{F06F05DE-C6B5-45B3-873A-5C0C210C6181}"/>
-              </a:ext>
-            </a:extLst>
-          </p:cNvPr>
-          <p:cNvSpPr>
-            <a:spLocks noGrp="1"/>
-          </p:cNvSpPr>
-          <p:nvPr>
-            <p:ph type="title"/>
-          </p:nvPr>
-        </p:nvSpPr>
-        <p:spPr>
-          <a:xfrm>
-            <a:off x="457200" y="188640"/>
-            <a:ext cx="8229600" cy="850105"/>
-          </a:xfrm>
-        </p:spPr>
-        <p:txBody>
-          <a:bodyPr anchor="ctr">
-            <a:normAutofit/>
-          </a:bodyPr>
-          <a:lstStyle/>
-          <a:p>
-            <a:r>
-              <a:rPr lang="cs-CZ" dirty="0"/>
-              <a:t>Cílový stav	</a:t>
-            </a:r>
-            <a:endParaRPr lang="sk-SK" dirty="0"/>
-          </a:p>
-        </p:txBody>
-      </p:sp>
-    </p:spTree>
-    <p:extLst>
-      <p:ext uri="{BB962C8B-B14F-4D97-AF65-F5344CB8AC3E}">
-        <p14:creationId xmlns:p14="http://schemas.microsoft.com/office/powerpoint/2010/main" val="4263751268"/>
-      </p:ext>
-    </p:extLst>
-  </p:cSld>
-  <p:clrMapOvr>
-    <a:masterClrMapping/>
-  </p:clrMapOvr>
-  <p:transition spd="slow">
-    <p:push dir="u"/>
-  </p:transition>
-</p:sld>
-</file>
-
 <file path=ppt/slides/slide4.xml><?xml version="1.0" encoding="utf-8"?>
 <p:sld xmlns:a="http://schemas.openxmlformats.org/drawingml/2006/main" xmlns:r="http://schemas.openxmlformats.org/officeDocument/2006/relationships" xmlns:p="http://schemas.openxmlformats.org/presentationml/2006/main">
   <p:cSld>
@@ -8162,6 +9037,7 @@
               <a:rPr lang="cs-CZ" dirty="0"/>
               <a:t>Vytvořit CookBook.BL.WEB.</a:t>
             </a:r>
+            <a:endParaRPr lang="en-US" dirty="0"/>
           </a:p>
           <a:p>
             <a:pPr marL="914400" lvl="1" indent="-457200">
@@ -8170,7 +9046,7 @@
             </a:pPr>
             <a:r>
               <a:rPr lang="cs-CZ" dirty="0"/>
-              <a:t>Vytvořit fasády.</a:t>
+              <a:t>Vygenerovat API klienty.</a:t>
             </a:r>
           </a:p>
           <a:p>
@@ -8180,7 +9056,7 @@
             </a:pPr>
             <a:r>
               <a:rPr lang="cs-CZ" dirty="0"/>
-              <a:t>Vygenerovat API klienty.</a:t>
+              <a:t>Vytvořit fasády.</a:t>
             </a:r>
           </a:p>
           <a:p>
@@ -8295,531 +9171,6 @@
 </file>
 
 <file path=ppt/slides/slide5.xml><?xml version="1.0" encoding="utf-8"?>
-<p:sld xmlns:a="http://schemas.openxmlformats.org/drawingml/2006/main" xmlns:r="http://schemas.openxmlformats.org/officeDocument/2006/relationships" xmlns:p="http://schemas.openxmlformats.org/presentationml/2006/main">
-  <p:cSld>
-    <p:spTree>
-      <p:nvGrpSpPr>
-        <p:cNvPr id="1" name=""/>
-        <p:cNvGrpSpPr/>
-        <p:nvPr/>
-      </p:nvGrpSpPr>
-      <p:grpSpPr>
-        <a:xfrm>
-          <a:off x="0" y="0"/>
-          <a:ext cx="0" cy="0"/>
-          <a:chOff x="0" y="0"/>
-          <a:chExt cx="0" cy="0"/>
-        </a:xfrm>
-      </p:grpSpPr>
-      <p:sp>
-        <p:nvSpPr>
-          <p:cNvPr id="2" name="Title 1">
-            <a:extLst>
-              <a:ext uri="{FF2B5EF4-FFF2-40B4-BE49-F238E27FC236}">
-                <a16:creationId xmlns:a16="http://schemas.microsoft.com/office/drawing/2014/main" id="{863A9E48-D92A-4567-82F4-BD0A1283CC7C}"/>
-              </a:ext>
-            </a:extLst>
-          </p:cNvPr>
-          <p:cNvSpPr>
-            <a:spLocks noGrp="1"/>
-          </p:cNvSpPr>
-          <p:nvPr>
-            <p:ph type="title"/>
-          </p:nvPr>
-        </p:nvSpPr>
-        <p:spPr/>
-        <p:txBody>
-          <a:bodyPr>
-            <a:normAutofit/>
-          </a:bodyPr>
-          <a:lstStyle/>
-          <a:p>
-            <a:r>
-              <a:rPr lang="en-US" dirty="0" err="1"/>
-              <a:t>Fas</a:t>
-            </a:r>
-            <a:r>
-              <a:rPr lang="cs-CZ" dirty="0"/>
-              <a:t>ády </a:t>
-            </a:r>
-            <a:r>
-              <a:rPr lang="en-US" dirty="0"/>
-              <a:t>/ F</a:t>
-            </a:r>
-            <a:r>
-              <a:rPr lang="en-US" b="0" i="0" dirty="0">
-                <a:solidFill>
-                  <a:srgbClr val="222222"/>
-                </a:solidFill>
-                <a:effectLst/>
-                <a:latin typeface="Google Sans"/>
-              </a:rPr>
-              <a:t>açade</a:t>
-            </a:r>
-            <a:endParaRPr lang="en-US" dirty="0"/>
-          </a:p>
-        </p:txBody>
-      </p:sp>
-      <p:pic>
-        <p:nvPicPr>
-          <p:cNvPr id="5" name="Content Placeholder 4" descr="Diagram&#10;&#10;Description automatically generated">
-            <a:extLst>
-              <a:ext uri="{FF2B5EF4-FFF2-40B4-BE49-F238E27FC236}">
-                <a16:creationId xmlns:a16="http://schemas.microsoft.com/office/drawing/2014/main" id="{4C4B1453-250A-44FA-82F4-6148C9BF3EB6}"/>
-              </a:ext>
-            </a:extLst>
-          </p:cNvPr>
-          <p:cNvPicPr>
-            <a:picLocks noGrp="1" noChangeAspect="1"/>
-          </p:cNvPicPr>
-          <p:nvPr>
-            <p:ph idx="1"/>
-          </p:nvPr>
-        </p:nvPicPr>
-        <p:blipFill>
-          <a:blip r:embed="rId2">
-            <a:extLst>
-              <a:ext uri="{28A0092B-C50C-407E-A947-70E740481C1C}">
-                <a14:useLocalDpi xmlns:a14="http://schemas.microsoft.com/office/drawing/2010/main" val="0"/>
-              </a:ext>
-            </a:extLst>
-          </a:blip>
-          <a:stretch>
-            <a:fillRect/>
-          </a:stretch>
-        </p:blipFill>
-        <p:spPr>
-          <a:xfrm>
-            <a:off x="3279274" y="2492896"/>
-            <a:ext cx="2585451" cy="3786566"/>
-          </a:xfrm>
-        </p:spPr>
-      </p:pic>
-      <p:sp>
-        <p:nvSpPr>
-          <p:cNvPr id="6" name="TextBox 5">
-            <a:extLst>
-              <a:ext uri="{FF2B5EF4-FFF2-40B4-BE49-F238E27FC236}">
-                <a16:creationId xmlns:a16="http://schemas.microsoft.com/office/drawing/2014/main" id="{E3E82A94-6777-4A9A-B1C0-4A368D3CF3B7}"/>
-              </a:ext>
-            </a:extLst>
-          </p:cNvPr>
-          <p:cNvSpPr txBox="1"/>
-          <p:nvPr/>
-        </p:nvSpPr>
-        <p:spPr>
-          <a:xfrm>
-            <a:off x="440145" y="1898248"/>
-            <a:ext cx="8229600" cy="738664"/>
-          </a:xfrm>
-          <a:prstGeom prst="rect">
-            <a:avLst/>
-          </a:prstGeom>
-          <a:noFill/>
-        </p:spPr>
-        <p:txBody>
-          <a:bodyPr wrap="square" rtlCol="0">
-            <a:spAutoFit/>
-          </a:bodyPr>
-          <a:lstStyle/>
-          <a:p>
-            <a:pPr algn="just"/>
-            <a:r>
-              <a:rPr lang="cs-CZ" sz="1400" dirty="0"/>
-              <a:t>Softwarový návrhový vzor, který slouží ke zjednodušení komunikace mezi jednotlivými částmi systému. Fasáda je způsob nahrazení velkého počtu rozhraní subsystémů, sjednoceným rozhraním, které bude zaštitovat všechna rozhraní subsystémů.</a:t>
-            </a:r>
-            <a:endParaRPr lang="en-US" sz="1400" dirty="0"/>
-          </a:p>
-        </p:txBody>
-      </p:sp>
-      <p:sp>
-        <p:nvSpPr>
-          <p:cNvPr id="8" name="TextBox 7">
-            <a:extLst>
-              <a:ext uri="{FF2B5EF4-FFF2-40B4-BE49-F238E27FC236}">
-                <a16:creationId xmlns:a16="http://schemas.microsoft.com/office/drawing/2014/main" id="{176A10EE-B14E-4B65-AE9B-6BD72095A34B}"/>
-              </a:ext>
-            </a:extLst>
-          </p:cNvPr>
-          <p:cNvSpPr txBox="1"/>
-          <p:nvPr/>
-        </p:nvSpPr>
-        <p:spPr>
-          <a:xfrm>
-            <a:off x="440145" y="1124744"/>
-            <a:ext cx="8229600" cy="584775"/>
-          </a:xfrm>
-          <a:prstGeom prst="rect">
-            <a:avLst/>
-          </a:prstGeom>
-          <a:noFill/>
-        </p:spPr>
-        <p:txBody>
-          <a:bodyPr wrap="square" rtlCol="0">
-            <a:spAutoFit/>
-          </a:bodyPr>
-          <a:lstStyle/>
-          <a:p>
-            <a:pPr algn="ctr"/>
-            <a:r>
-              <a:rPr lang="cs-CZ" b="1" dirty="0">
-                <a:solidFill>
-                  <a:srgbClr val="C00000"/>
-                </a:solidFill>
-              </a:rPr>
-              <a:t>Způsob jak schovat komplexní magii za jednoduché rozhraní.</a:t>
-            </a:r>
-            <a:br>
-              <a:rPr lang="cs-CZ" b="1" dirty="0"/>
-            </a:br>
-            <a:r>
-              <a:rPr lang="cs-CZ" sz="1400" b="1" dirty="0"/>
-              <a:t>Umožnuje nám měnit vnitřní implementaci bez toho aby jsme rozbily kód co funkcionalitu používá.</a:t>
-            </a:r>
-            <a:endParaRPr lang="en-US" b="1" dirty="0"/>
-          </a:p>
-        </p:txBody>
-      </p:sp>
-      <p:sp>
-        <p:nvSpPr>
-          <p:cNvPr id="9" name="TextBox 8">
-            <a:extLst>
-              <a:ext uri="{FF2B5EF4-FFF2-40B4-BE49-F238E27FC236}">
-                <a16:creationId xmlns:a16="http://schemas.microsoft.com/office/drawing/2014/main" id="{18908FD3-59C8-4B22-915A-1FC03D0B9C8A}"/>
-              </a:ext>
-            </a:extLst>
-          </p:cNvPr>
-          <p:cNvSpPr txBox="1"/>
-          <p:nvPr/>
-        </p:nvSpPr>
-        <p:spPr>
-          <a:xfrm>
-            <a:off x="167580" y="1628800"/>
-            <a:ext cx="476911" cy="1200329"/>
-          </a:xfrm>
-          <a:prstGeom prst="rect">
-            <a:avLst/>
-          </a:prstGeom>
-          <a:noFill/>
-        </p:spPr>
-        <p:txBody>
-          <a:bodyPr wrap="square" rtlCol="0">
-            <a:spAutoFit/>
-          </a:bodyPr>
-          <a:lstStyle/>
-          <a:p>
-            <a:r>
-              <a:rPr lang="en-US" sz="7200" dirty="0"/>
-              <a:t>{</a:t>
-            </a:r>
-          </a:p>
-        </p:txBody>
-      </p:sp>
-      <p:sp>
-        <p:nvSpPr>
-          <p:cNvPr id="11" name="TextBox 10">
-            <a:extLst>
-              <a:ext uri="{FF2B5EF4-FFF2-40B4-BE49-F238E27FC236}">
-                <a16:creationId xmlns:a16="http://schemas.microsoft.com/office/drawing/2014/main" id="{AFDEBB38-0FC9-4F65-A675-8417312B2E31}"/>
-              </a:ext>
-            </a:extLst>
-          </p:cNvPr>
-          <p:cNvSpPr txBox="1"/>
-          <p:nvPr/>
-        </p:nvSpPr>
-        <p:spPr>
-          <a:xfrm>
-            <a:off x="8431289" y="1628799"/>
-            <a:ext cx="476911" cy="1200329"/>
-          </a:xfrm>
-          <a:prstGeom prst="rect">
-            <a:avLst/>
-          </a:prstGeom>
-          <a:noFill/>
-        </p:spPr>
-        <p:txBody>
-          <a:bodyPr wrap="square" rtlCol="0">
-            <a:spAutoFit/>
-          </a:bodyPr>
-          <a:lstStyle/>
-          <a:p>
-            <a:r>
-              <a:rPr lang="en-US" sz="7200" dirty="0"/>
-              <a:t>}</a:t>
-            </a:r>
-          </a:p>
-        </p:txBody>
-      </p:sp>
-    </p:spTree>
-    <p:extLst>
-      <p:ext uri="{BB962C8B-B14F-4D97-AF65-F5344CB8AC3E}">
-        <p14:creationId xmlns:p14="http://schemas.microsoft.com/office/powerpoint/2010/main" val="2079306316"/>
-      </p:ext>
-    </p:extLst>
-  </p:cSld>
-  <p:clrMapOvr>
-    <a:masterClrMapping/>
-  </p:clrMapOvr>
-  <p:transition spd="slow">
-    <p:push dir="u"/>
-  </p:transition>
-</p:sld>
-</file>
-
-<file path=ppt/slides/slide6.xml><?xml version="1.0" encoding="utf-8"?>
-<p:sld xmlns:a="http://schemas.openxmlformats.org/drawingml/2006/main" xmlns:r="http://schemas.openxmlformats.org/officeDocument/2006/relationships" xmlns:p="http://schemas.openxmlformats.org/presentationml/2006/main">
-  <p:cSld>
-    <p:spTree>
-      <p:nvGrpSpPr>
-        <p:cNvPr id="1" name=""/>
-        <p:cNvGrpSpPr/>
-        <p:nvPr/>
-      </p:nvGrpSpPr>
-      <p:grpSpPr>
-        <a:xfrm>
-          <a:off x="0" y="0"/>
-          <a:ext cx="0" cy="0"/>
-          <a:chOff x="0" y="0"/>
-          <a:chExt cx="0" cy="0"/>
-        </a:xfrm>
-      </p:grpSpPr>
-      <p:pic>
-        <p:nvPicPr>
-          <p:cNvPr id="8" name="Picture 7" descr="Icon&#10;&#10;Description automatically generated">
-            <a:extLst>
-              <a:ext uri="{FF2B5EF4-FFF2-40B4-BE49-F238E27FC236}">
-                <a16:creationId xmlns:a16="http://schemas.microsoft.com/office/drawing/2014/main" id="{0CAD7850-D62B-4B40-8E7A-16B62E947C9F}"/>
-              </a:ext>
-            </a:extLst>
-          </p:cNvPr>
-          <p:cNvPicPr>
-            <a:picLocks noChangeAspect="1"/>
-          </p:cNvPicPr>
-          <p:nvPr/>
-        </p:nvPicPr>
-        <p:blipFill>
-          <a:blip r:embed="rId2">
-            <a:extLst>
-              <a:ext uri="{28A0092B-C50C-407E-A947-70E740481C1C}">
-                <a14:useLocalDpi xmlns:a14="http://schemas.microsoft.com/office/drawing/2010/main" val="0"/>
-              </a:ext>
-            </a:extLst>
-          </a:blip>
-          <a:stretch>
-            <a:fillRect/>
-          </a:stretch>
-        </p:blipFill>
-        <p:spPr>
-          <a:xfrm>
-            <a:off x="2986087" y="1666875"/>
-            <a:ext cx="3171825" cy="3524250"/>
-          </a:xfrm>
-          <a:prstGeom prst="rect">
-            <a:avLst/>
-          </a:prstGeom>
-        </p:spPr>
-      </p:pic>
-    </p:spTree>
-    <p:extLst>
-      <p:ext uri="{BB962C8B-B14F-4D97-AF65-F5344CB8AC3E}">
-        <p14:creationId xmlns:p14="http://schemas.microsoft.com/office/powerpoint/2010/main" val="2873504109"/>
-      </p:ext>
-    </p:extLst>
-  </p:cSld>
-  <p:clrMapOvr>
-    <a:masterClrMapping/>
-  </p:clrMapOvr>
-  <p:transition spd="slow">
-    <p:push dir="u"/>
-  </p:transition>
-</p:sld>
-</file>
-
-<file path=ppt/slides/slide7.xml><?xml version="1.0" encoding="utf-8"?>
-<p:sld xmlns:a="http://schemas.openxmlformats.org/drawingml/2006/main" xmlns:r="http://schemas.openxmlformats.org/officeDocument/2006/relationships" xmlns:p="http://schemas.openxmlformats.org/presentationml/2006/main">
-  <p:cSld>
-    <p:spTree>
-      <p:nvGrpSpPr>
-        <p:cNvPr id="1" name=""/>
-        <p:cNvGrpSpPr/>
-        <p:nvPr/>
-      </p:nvGrpSpPr>
-      <p:grpSpPr>
-        <a:xfrm>
-          <a:off x="0" y="0"/>
-          <a:ext cx="0" cy="0"/>
-          <a:chOff x="0" y="0"/>
-          <a:chExt cx="0" cy="0"/>
-        </a:xfrm>
-      </p:grpSpPr>
-      <p:sp>
-        <p:nvSpPr>
-          <p:cNvPr id="2" name="Title 1">
-            <a:extLst>
-              <a:ext uri="{FF2B5EF4-FFF2-40B4-BE49-F238E27FC236}">
-                <a16:creationId xmlns:a16="http://schemas.microsoft.com/office/drawing/2014/main" id="{50C6F60E-D0FA-42BA-99A2-8B0ADADF16F2}"/>
-              </a:ext>
-            </a:extLst>
-          </p:cNvPr>
-          <p:cNvSpPr>
-            <a:spLocks noGrp="1"/>
-          </p:cNvSpPr>
-          <p:nvPr>
-            <p:ph type="title"/>
-          </p:nvPr>
-        </p:nvSpPr>
-        <p:spPr/>
-        <p:txBody>
-          <a:bodyPr/>
-          <a:lstStyle/>
-          <a:p>
-            <a:r>
-              <a:rPr lang="cs-CZ" dirty="0"/>
-              <a:t>Postup napojení na backend</a:t>
-            </a:r>
-            <a:endParaRPr lang="en-US" dirty="0"/>
-          </a:p>
-        </p:txBody>
-      </p:sp>
-      <p:sp>
-        <p:nvSpPr>
-          <p:cNvPr id="3" name="Content Placeholder 2">
-            <a:extLst>
-              <a:ext uri="{FF2B5EF4-FFF2-40B4-BE49-F238E27FC236}">
-                <a16:creationId xmlns:a16="http://schemas.microsoft.com/office/drawing/2014/main" id="{8D065E49-B560-4649-8800-3AD602721431}"/>
-              </a:ext>
-            </a:extLst>
-          </p:cNvPr>
-          <p:cNvSpPr>
-            <a:spLocks noGrp="1"/>
-          </p:cNvSpPr>
-          <p:nvPr>
-            <p:ph idx="1"/>
-          </p:nvPr>
-        </p:nvSpPr>
-        <p:spPr>
-          <a:xfrm>
-            <a:off x="251520" y="1268761"/>
-            <a:ext cx="8892480" cy="4857404"/>
-          </a:xfrm>
-        </p:spPr>
-        <p:txBody>
-          <a:bodyPr/>
-          <a:lstStyle/>
-          <a:p>
-            <a:pPr marL="457200" indent="-457200">
-              <a:buFont typeface="+mj-lt"/>
-              <a:buAutoNum type="arabicPeriod"/>
-            </a:pPr>
-            <a:r>
-              <a:rPr lang="cs-CZ" dirty="0"/>
-              <a:t>Vytvořit CookBook.BL.WEB.</a:t>
-            </a:r>
-          </a:p>
-          <a:p>
-            <a:pPr marL="914400" lvl="1" indent="-457200">
-              <a:buFont typeface="+mj-lt"/>
-              <a:buAutoNum type="arabicPeriod"/>
-            </a:pPr>
-            <a:r>
-              <a:rPr lang="cs-CZ" strike="sngStrike" dirty="0"/>
-              <a:t>Vytvořit fasády.</a:t>
-            </a:r>
-          </a:p>
-          <a:p>
-            <a:pPr marL="914400" lvl="1" indent="-457200">
-              <a:buFont typeface="+mj-lt"/>
-              <a:buAutoNum type="arabicPeriod"/>
-            </a:pPr>
-            <a:r>
-              <a:rPr lang="cs-CZ" dirty="0"/>
-              <a:t>Vygenerovat API klienty.</a:t>
-            </a:r>
-          </a:p>
-          <a:p>
-            <a:pPr marL="457200" indent="-457200">
-              <a:buFont typeface="+mj-lt"/>
-              <a:buAutoNum type="arabicPeriod"/>
-            </a:pPr>
-            <a:r>
-              <a:rPr lang="cs-CZ" dirty="0"/>
-              <a:t>Nastavit WEB tak aby komunikoval s API</a:t>
-            </a:r>
-            <a:r>
-              <a:rPr lang="en-US" dirty="0"/>
-              <a:t>.</a:t>
-            </a:r>
-            <a:endParaRPr lang="cs-CZ" dirty="0"/>
-          </a:p>
-          <a:p>
-            <a:pPr marL="457200" indent="-457200">
-              <a:buFont typeface="+mj-lt"/>
-              <a:buAutoNum type="arabicPeriod"/>
-            </a:pPr>
-            <a:r>
-              <a:rPr lang="cs-CZ" dirty="0"/>
-              <a:t>Zajistit aby uživatel nemohl posílat na API nevalidní data.</a:t>
-            </a:r>
-            <a:br>
-              <a:rPr lang="cs-CZ" dirty="0"/>
-            </a:br>
-            <a:r>
-              <a:rPr lang="en-US" dirty="0"/>
-              <a:t>(VALIDACE)</a:t>
-            </a:r>
-          </a:p>
-          <a:p>
-            <a:pPr marL="457200" indent="-457200">
-              <a:buFont typeface="+mj-lt"/>
-              <a:buAutoNum type="arabicPeriod"/>
-            </a:pPr>
-            <a:r>
-              <a:rPr lang="en-US" dirty="0" err="1"/>
-              <a:t>Zajistit</a:t>
-            </a:r>
-            <a:r>
-              <a:rPr lang="en-US" dirty="0"/>
-              <a:t> </a:t>
-            </a:r>
-            <a:r>
-              <a:rPr lang="en-US" dirty="0" err="1"/>
-              <a:t>spr</a:t>
-            </a:r>
-            <a:r>
-              <a:rPr lang="cs-CZ" dirty="0"/>
-              <a:t>ávnou reakci WEBu na chyby z API.</a:t>
-            </a:r>
-          </a:p>
-          <a:p>
-            <a:pPr lvl="1"/>
-            <a:endParaRPr lang="cs-CZ" dirty="0"/>
-          </a:p>
-          <a:p>
-            <a:pPr marL="457200" indent="-457200">
-              <a:buFont typeface="+mj-lt"/>
-              <a:buAutoNum type="arabicPeriod"/>
-            </a:pPr>
-            <a:endParaRPr lang="en-US" dirty="0"/>
-          </a:p>
-        </p:txBody>
-      </p:sp>
-    </p:spTree>
-    <p:extLst>
-      <p:ext uri="{BB962C8B-B14F-4D97-AF65-F5344CB8AC3E}">
-        <p14:creationId xmlns:p14="http://schemas.microsoft.com/office/powerpoint/2010/main" val="4178516744"/>
-      </p:ext>
-    </p:extLst>
-  </p:cSld>
-  <p:clrMapOvr>
-    <a:masterClrMapping/>
-  </p:clrMapOvr>
-  <p:transition spd="slow">
-    <p:push dir="u"/>
-  </p:transition>
-</p:sld>
-</file>
-
-<file path=ppt/slides/slide8.xml><?xml version="1.0" encoding="utf-8"?>
 <p:sld xmlns:a="http://schemas.openxmlformats.org/drawingml/2006/main" xmlns:r="http://schemas.openxmlformats.org/officeDocument/2006/relationships" xmlns:p="http://schemas.openxmlformats.org/presentationml/2006/main">
   <p:cSld>
     <p:spTree>
@@ -8920,7 +9271,7 @@
 </p:sld>
 </file>
 
-<file path=ppt/slides/slide9.xml><?xml version="1.0" encoding="utf-8"?>
+<file path=ppt/slides/slide6.xml><?xml version="1.0" encoding="utf-8"?>
 <p:sld xmlns:a="http://schemas.openxmlformats.org/drawingml/2006/main" xmlns:r="http://schemas.openxmlformats.org/officeDocument/2006/relationships" xmlns:p="http://schemas.openxmlformats.org/presentationml/2006/main">
   <p:cSld>
     <p:bg>
@@ -9246,6 +9597,329 @@
     <p:extLst>
       <p:ext uri="{BB962C8B-B14F-4D97-AF65-F5344CB8AC3E}">
         <p14:creationId xmlns:p14="http://schemas.microsoft.com/office/powerpoint/2010/main" val="1456864835"/>
+      </p:ext>
+    </p:extLst>
+  </p:cSld>
+  <p:clrMapOvr>
+    <a:masterClrMapping/>
+  </p:clrMapOvr>
+  <p:transition spd="slow">
+    <p:push dir="u"/>
+  </p:transition>
+</p:sld>
+</file>
+
+<file path=ppt/slides/slide7.xml><?xml version="1.0" encoding="utf-8"?>
+<p:sld xmlns:a="http://schemas.openxmlformats.org/drawingml/2006/main" xmlns:r="http://schemas.openxmlformats.org/officeDocument/2006/relationships" xmlns:p="http://schemas.openxmlformats.org/presentationml/2006/main">
+  <p:cSld>
+    <p:spTree>
+      <p:nvGrpSpPr>
+        <p:cNvPr id="1" name=""/>
+        <p:cNvGrpSpPr/>
+        <p:nvPr/>
+      </p:nvGrpSpPr>
+      <p:grpSpPr>
+        <a:xfrm>
+          <a:off x="0" y="0"/>
+          <a:ext cx="0" cy="0"/>
+          <a:chOff x="0" y="0"/>
+          <a:chExt cx="0" cy="0"/>
+        </a:xfrm>
+      </p:grpSpPr>
+      <p:sp>
+        <p:nvSpPr>
+          <p:cNvPr id="2" name="Title 1">
+            <a:extLst>
+              <a:ext uri="{FF2B5EF4-FFF2-40B4-BE49-F238E27FC236}">
+                <a16:creationId xmlns:a16="http://schemas.microsoft.com/office/drawing/2014/main" id="{C6A426FE-FA3B-4652-95C0-D6FF6A8C72A3}"/>
+              </a:ext>
+            </a:extLst>
+          </p:cNvPr>
+          <p:cNvSpPr>
+            <a:spLocks noGrp="1"/>
+          </p:cNvSpPr>
+          <p:nvPr>
+            <p:ph type="title"/>
+          </p:nvPr>
+        </p:nvSpPr>
+        <p:spPr>
+          <a:xfrm>
+            <a:off x="3491880" y="2857500"/>
+            <a:ext cx="2160240" cy="1143000"/>
+          </a:xfrm>
+        </p:spPr>
+        <p:txBody>
+          <a:bodyPr>
+            <a:normAutofit fontScale="90000"/>
+          </a:bodyPr>
+          <a:lstStyle/>
+          <a:p>
+            <a:r>
+              <a:rPr lang="cs-CZ" dirty="0"/>
+              <a:t>NSWAG studio step by step</a:t>
+            </a:r>
+            <a:endParaRPr lang="en-US" dirty="0"/>
+          </a:p>
+        </p:txBody>
+      </p:sp>
+    </p:spTree>
+    <p:extLst>
+      <p:ext uri="{BB962C8B-B14F-4D97-AF65-F5344CB8AC3E}">
+        <p14:creationId xmlns:p14="http://schemas.microsoft.com/office/powerpoint/2010/main" val="2202362840"/>
+      </p:ext>
+    </p:extLst>
+  </p:cSld>
+  <p:clrMapOvr>
+    <a:masterClrMapping/>
+  </p:clrMapOvr>
+  <p:transition spd="slow">
+    <p:push dir="u"/>
+  </p:transition>
+</p:sld>
+</file>
+
+<file path=ppt/slides/slide8.xml><?xml version="1.0" encoding="utf-8"?>
+<p:sld xmlns:a="http://schemas.openxmlformats.org/drawingml/2006/main" xmlns:r="http://schemas.openxmlformats.org/officeDocument/2006/relationships" xmlns:p="http://schemas.openxmlformats.org/presentationml/2006/main">
+  <p:cSld>
+    <p:spTree>
+      <p:nvGrpSpPr>
+        <p:cNvPr id="1" name=""/>
+        <p:cNvGrpSpPr/>
+        <p:nvPr/>
+      </p:nvGrpSpPr>
+      <p:grpSpPr>
+        <a:xfrm>
+          <a:off x="0" y="0"/>
+          <a:ext cx="0" cy="0"/>
+          <a:chOff x="0" y="0"/>
+          <a:chExt cx="0" cy="0"/>
+        </a:xfrm>
+      </p:grpSpPr>
+      <p:pic>
+        <p:nvPicPr>
+          <p:cNvPr id="8" name="Picture 7" descr="Icon&#10;&#10;Description automatically generated">
+            <a:extLst>
+              <a:ext uri="{FF2B5EF4-FFF2-40B4-BE49-F238E27FC236}">
+                <a16:creationId xmlns:a16="http://schemas.microsoft.com/office/drawing/2014/main" id="{0CAD7850-D62B-4B40-8E7A-16B62E947C9F}"/>
+              </a:ext>
+            </a:extLst>
+          </p:cNvPr>
+          <p:cNvPicPr>
+            <a:picLocks noChangeAspect="1"/>
+          </p:cNvPicPr>
+          <p:nvPr/>
+        </p:nvPicPr>
+        <p:blipFill>
+          <a:blip r:embed="rId2">
+            <a:extLst>
+              <a:ext uri="{28A0092B-C50C-407E-A947-70E740481C1C}">
+                <a14:useLocalDpi xmlns:a14="http://schemas.microsoft.com/office/drawing/2010/main" val="0"/>
+              </a:ext>
+            </a:extLst>
+          </a:blip>
+          <a:stretch>
+            <a:fillRect/>
+          </a:stretch>
+        </p:blipFill>
+        <p:spPr>
+          <a:xfrm>
+            <a:off x="2986087" y="1666875"/>
+            <a:ext cx="3171825" cy="3524250"/>
+          </a:xfrm>
+          <a:prstGeom prst="rect">
+            <a:avLst/>
+          </a:prstGeom>
+        </p:spPr>
+      </p:pic>
+    </p:spTree>
+    <p:extLst>
+      <p:ext uri="{BB962C8B-B14F-4D97-AF65-F5344CB8AC3E}">
+        <p14:creationId xmlns:p14="http://schemas.microsoft.com/office/powerpoint/2010/main" val="2873504109"/>
+      </p:ext>
+    </p:extLst>
+  </p:cSld>
+  <p:clrMapOvr>
+    <a:masterClrMapping/>
+  </p:clrMapOvr>
+  <p:transition spd="slow">
+    <p:push dir="u"/>
+  </p:transition>
+</p:sld>
+</file>
+
+<file path=ppt/slides/slide9.xml><?xml version="1.0" encoding="utf-8"?>
+<p:sld xmlns:a="http://schemas.openxmlformats.org/drawingml/2006/main" xmlns:r="http://schemas.openxmlformats.org/officeDocument/2006/relationships" xmlns:p="http://schemas.openxmlformats.org/presentationml/2006/main">
+  <p:cSld>
+    <p:spTree>
+      <p:nvGrpSpPr>
+        <p:cNvPr id="1" name=""/>
+        <p:cNvGrpSpPr/>
+        <p:nvPr/>
+      </p:nvGrpSpPr>
+      <p:grpSpPr>
+        <a:xfrm>
+          <a:off x="0" y="0"/>
+          <a:ext cx="0" cy="0"/>
+          <a:chOff x="0" y="0"/>
+          <a:chExt cx="0" cy="0"/>
+        </a:xfrm>
+      </p:grpSpPr>
+      <p:sp>
+        <p:nvSpPr>
+          <p:cNvPr id="2" name="Title 1">
+            <a:extLst>
+              <a:ext uri="{FF2B5EF4-FFF2-40B4-BE49-F238E27FC236}">
+                <a16:creationId xmlns:a16="http://schemas.microsoft.com/office/drawing/2014/main" id="{50C6F60E-D0FA-42BA-99A2-8B0ADADF16F2}"/>
+              </a:ext>
+            </a:extLst>
+          </p:cNvPr>
+          <p:cNvSpPr>
+            <a:spLocks noGrp="1"/>
+          </p:cNvSpPr>
+          <p:nvPr>
+            <p:ph type="title"/>
+          </p:nvPr>
+        </p:nvSpPr>
+        <p:spPr/>
+        <p:txBody>
+          <a:bodyPr/>
+          <a:lstStyle/>
+          <a:p>
+            <a:r>
+              <a:rPr lang="cs-CZ" dirty="0"/>
+              <a:t>Postup napojení na backend</a:t>
+            </a:r>
+            <a:endParaRPr lang="en-US" dirty="0"/>
+          </a:p>
+        </p:txBody>
+      </p:sp>
+      <p:sp>
+        <p:nvSpPr>
+          <p:cNvPr id="3" name="Content Placeholder 2">
+            <a:extLst>
+              <a:ext uri="{FF2B5EF4-FFF2-40B4-BE49-F238E27FC236}">
+                <a16:creationId xmlns:a16="http://schemas.microsoft.com/office/drawing/2014/main" id="{8D065E49-B560-4649-8800-3AD602721431}"/>
+              </a:ext>
+            </a:extLst>
+          </p:cNvPr>
+          <p:cNvSpPr>
+            <a:spLocks noGrp="1"/>
+          </p:cNvSpPr>
+          <p:nvPr>
+            <p:ph idx="1"/>
+          </p:nvPr>
+        </p:nvSpPr>
+        <p:spPr>
+          <a:xfrm>
+            <a:off x="251520" y="1268761"/>
+            <a:ext cx="8892480" cy="4857404"/>
+          </a:xfrm>
+        </p:spPr>
+        <p:txBody>
+          <a:bodyPr/>
+          <a:lstStyle/>
+          <a:p>
+            <a:pPr marL="457200" indent="-457200">
+              <a:buFont typeface="+mj-lt"/>
+              <a:buAutoNum type="arabicPeriod"/>
+            </a:pPr>
+            <a:r>
+              <a:rPr lang="cs-CZ" dirty="0"/>
+              <a:t>Vytvořit CookBook.BL.WEB.</a:t>
+            </a:r>
+            <a:endParaRPr lang="en-US" dirty="0"/>
+          </a:p>
+          <a:p>
+            <a:pPr marL="914400" lvl="1" indent="-457200">
+              <a:buFont typeface="+mj-lt"/>
+              <a:buAutoNum type="arabicPeriod"/>
+            </a:pPr>
+            <a:r>
+              <a:rPr lang="cs-CZ" strike="sngStrike" dirty="0"/>
+              <a:t>Vygenerovat API klienty.</a:t>
+            </a:r>
+          </a:p>
+          <a:p>
+            <a:pPr marL="914400" lvl="1" indent="-457200">
+              <a:buFont typeface="+mj-lt"/>
+              <a:buAutoNum type="arabicPeriod"/>
+            </a:pPr>
+            <a:r>
+              <a:rPr lang="cs-CZ" dirty="0"/>
+              <a:t>Vytvořit fasády.</a:t>
+            </a:r>
+          </a:p>
+          <a:p>
+            <a:pPr marL="457200" indent="-457200">
+              <a:buFont typeface="+mj-lt"/>
+              <a:buAutoNum type="arabicPeriod"/>
+            </a:pPr>
+            <a:r>
+              <a:rPr lang="cs-CZ" dirty="0"/>
+              <a:t>Nastavit WEB tak aby komunikoval s API</a:t>
+            </a:r>
+            <a:r>
+              <a:rPr lang="en-US" dirty="0"/>
+              <a:t>.</a:t>
+            </a:r>
+            <a:endParaRPr lang="cs-CZ" dirty="0"/>
+          </a:p>
+          <a:p>
+            <a:pPr marL="457200" indent="-457200">
+              <a:buFont typeface="+mj-lt"/>
+              <a:buAutoNum type="arabicPeriod"/>
+            </a:pPr>
+            <a:r>
+              <a:rPr lang="cs-CZ" dirty="0"/>
+              <a:t>Zajistit aby uživatel nemohl posílat na API nevalidní data.</a:t>
+            </a:r>
+            <a:br>
+              <a:rPr lang="cs-CZ" dirty="0"/>
+            </a:br>
+            <a:r>
+              <a:rPr lang="en-US" dirty="0"/>
+              <a:t>(VALIDACE)</a:t>
+            </a:r>
+          </a:p>
+          <a:p>
+            <a:pPr marL="457200" indent="-457200">
+              <a:buFont typeface="+mj-lt"/>
+              <a:buAutoNum type="arabicPeriod"/>
+            </a:pPr>
+            <a:r>
+              <a:rPr lang="en-US" dirty="0" err="1"/>
+              <a:t>Zajistit</a:t>
+            </a:r>
+            <a:r>
+              <a:rPr lang="en-US" dirty="0"/>
+              <a:t> </a:t>
+            </a:r>
+            <a:r>
+              <a:rPr lang="en-US" dirty="0" err="1"/>
+              <a:t>spr</a:t>
+            </a:r>
+            <a:r>
+              <a:rPr lang="cs-CZ" dirty="0"/>
+              <a:t>ávnou reakci WEBu na chyby z API.</a:t>
+            </a:r>
+          </a:p>
+          <a:p>
+            <a:pPr lvl="1"/>
+            <a:endParaRPr lang="cs-CZ" dirty="0"/>
+          </a:p>
+          <a:p>
+            <a:pPr marL="457200" indent="-457200">
+              <a:buFont typeface="+mj-lt"/>
+              <a:buAutoNum type="arabicPeriod"/>
+            </a:pPr>
+            <a:endParaRPr lang="en-US" dirty="0"/>
+          </a:p>
+        </p:txBody>
+      </p:sp>
+    </p:spTree>
+    <p:extLst>
+      <p:ext uri="{BB962C8B-B14F-4D97-AF65-F5344CB8AC3E}">
+        <p14:creationId xmlns:p14="http://schemas.microsoft.com/office/powerpoint/2010/main" val="4178516744"/>
       </p:ext>
     </p:extLst>
   </p:cSld>

</xml_diff>